<commit_message>
Meeting notes and images
</commit_message>
<xml_diff>
--- a/docs/Presentation.pptx
+++ b/docs/Presentation.pptx
@@ -6,9 +6,13 @@
   </p:sldMasterIdLst>
   <p:sldIdLst>
     <p:sldId id="256" r:id="rId3"/>
-    <p:sldId id="257" r:id="rId4"/>
+    <p:sldId id="260" r:id="rId4"/>
     <p:sldId id="258" r:id="rId5"/>
-    <p:sldId id="259" r:id="rId6"/>
+    <p:sldId id="265" r:id="rId6"/>
+    <p:sldId id="270" r:id="rId7"/>
+    <p:sldId id="273" r:id="rId8"/>
+    <p:sldId id="272" r:id="rId9"/>
+    <p:sldId id="274" r:id="rId10"/>
   </p:sldIdLst>
   <p:sldSz cx="12192000" cy="6858000"/>
   <p:notesSz cx="6858000" cy="9144000"/>
@@ -3060,7 +3064,6 @@
           <a:p>
             <a:r>
               <a:rPr lang="en-US" sz="5400">
-                <a:ln/>
                 <a:solidFill>
                   <a:schemeClr val="tx1"/>
                 </a:solidFill>
@@ -3079,7 +3082,6 @@
             </a:r>
             <a:r>
               <a:rPr lang="en-US" sz="8000">
-                <a:ln/>
                 <a:solidFill>
                   <a:schemeClr val="tx1"/>
                 </a:solidFill>
@@ -3097,7 +3099,6 @@
               <a:t>COMPUTING FFT</a:t>
             </a:r>
             <a:endParaRPr lang="en-US" sz="8000" dirty="0">
-              <a:ln/>
               <a:solidFill>
                 <a:schemeClr val="tx1"/>
               </a:solidFill>
@@ -3142,7 +3143,6 @@
           <a:p>
             <a:r>
               <a:rPr lang="en-US" sz="3200">
-                <a:ln/>
                 <a:solidFill>
                   <a:schemeClr val="tx1"/>
                 </a:solidFill>
@@ -3159,7 +3159,6 @@
               <a:t>Use Alglib API to Compute FFT of a Time Domain Vector</a:t>
             </a:r>
             <a:endParaRPr lang="en-US" sz="3200">
-              <a:ln/>
               <a:solidFill>
                 <a:schemeClr val="tx1"/>
               </a:solidFill>
@@ -3206,18 +3205,46 @@
         </p:nvSpPr>
         <p:spPr>
           <a:xfrm>
-            <a:off x="4785995" y="479425"/>
-            <a:ext cx="4211320" cy="972185"/>
+            <a:off x="2192655" y="273685"/>
+            <a:ext cx="8112125" cy="1318260"/>
           </a:xfrm>
         </p:spPr>
         <p:txBody>
           <a:bodyPr/>
           <a:p>
             <a:r>
-              <a:rPr lang="en-US"/>
-              <a:t>FLOW CHART</a:t>
-            </a:r>
-            <a:endParaRPr lang="en-US"/>
+              <a:rPr lang="en-US">
+                <a:solidFill>
+                  <a:schemeClr val="tx1"/>
+                </a:solidFill>
+                <a:effectLst>
+                  <a:outerShdw blurRad="38100" dist="19050" dir="2700000" algn="tl" rotWithShape="0">
+                    <a:schemeClr val="dk1">
+                      <a:alpha val="40000"/>
+                    </a:schemeClr>
+                  </a:outerShdw>
+                </a:effectLst>
+                <a:latin typeface="MS PGothic" panose="020B0600070205080204" charset="-128"/>
+                <a:ea typeface="MS PGothic" panose="020B0600070205080204" charset="-128"/>
+                <a:sym typeface="+mn-ea"/>
+              </a:rPr>
+              <a:t>COMPUTING FFT - Approach 1</a:t>
+            </a:r>
+            <a:endParaRPr lang="en-US">
+              <a:solidFill>
+                <a:schemeClr val="tx1"/>
+              </a:solidFill>
+              <a:effectLst>
+                <a:outerShdw blurRad="38100" dist="19050" dir="2700000" algn="tl" rotWithShape="0">
+                  <a:schemeClr val="dk1">
+                    <a:alpha val="40000"/>
+                  </a:schemeClr>
+                </a:outerShdw>
+              </a:effectLst>
+              <a:latin typeface="MS PGothic" panose="020B0600070205080204" charset="-128"/>
+              <a:ea typeface="MS PGothic" panose="020B0600070205080204" charset="-128"/>
+              <a:sym typeface="+mn-ea"/>
+            </a:endParaRPr>
           </a:p>
         </p:txBody>
       </p:sp>
@@ -3229,18 +3256,20 @@
         </p:nvSpPr>
         <p:spPr>
           <a:xfrm>
-            <a:off x="9460865" y="4957445"/>
+            <a:off x="9537065" y="2713355"/>
             <a:ext cx="2538730" cy="1610995"/>
           </a:xfrm>
           <a:prstGeom prst="rect">
             <a:avLst/>
           </a:prstGeom>
           <a:solidFill>
-            <a:schemeClr val="accent4">
-              <a:lumMod val="20000"/>
-              <a:lumOff val="80000"/>
-            </a:schemeClr>
+            <a:schemeClr val="bg1"/>
           </a:solidFill>
+          <a:ln>
+            <a:solidFill>
+              <a:srgbClr val="92D050"/>
+            </a:solidFill>
+          </a:ln>
         </p:spPr>
         <p:style>
           <a:lnRef idx="2">
@@ -3288,18 +3317,30 @@
         </p:nvSpPr>
         <p:spPr>
           <a:xfrm>
-            <a:off x="5622290" y="3121025"/>
+            <a:off x="6363335" y="2713355"/>
             <a:ext cx="2538730" cy="1610995"/>
           </a:xfrm>
           <a:prstGeom prst="rect">
             <a:avLst/>
           </a:prstGeom>
-          <a:solidFill>
-            <a:schemeClr val="accent1">
-              <a:lumMod val="20000"/>
-              <a:lumOff val="80000"/>
-            </a:schemeClr>
-          </a:solidFill>
+          <a:noFill/>
+          <a:ln>
+            <a:solidFill>
+              <a:srgbClr val="00B0F0"/>
+            </a:solidFill>
+          </a:ln>
+          <a:extLst>
+            <a:ext uri="{909E8E84-426E-40DD-AFC4-6F175D3DCCD1}">
+              <a14:hiddenFill xmlns:a14="http://schemas.microsoft.com/office/drawing/2010/main">
+                <a:solidFill>
+                  <a:schemeClr val="accent1">
+                    <a:lumMod val="20000"/>
+                    <a:lumOff val="80000"/>
+                  </a:schemeClr>
+                </a:solidFill>
+              </a14:hiddenFill>
+            </a:ext>
+          </a:extLst>
         </p:spPr>
         <p:style>
           <a:lnRef idx="2">
@@ -3347,18 +3388,20 @@
         </p:nvSpPr>
         <p:spPr>
           <a:xfrm>
-            <a:off x="201295" y="5073650"/>
+            <a:off x="3189605" y="2713355"/>
             <a:ext cx="2538730" cy="1610995"/>
           </a:xfrm>
           <a:prstGeom prst="rect">
             <a:avLst/>
           </a:prstGeom>
           <a:solidFill>
-            <a:schemeClr val="accent2">
-              <a:lumMod val="20000"/>
-              <a:lumOff val="80000"/>
-            </a:schemeClr>
+            <a:schemeClr val="bg1"/>
           </a:solidFill>
+          <a:ln>
+            <a:solidFill>
+              <a:srgbClr val="00B0F0"/>
+            </a:solidFill>
+          </a:ln>
         </p:spPr>
         <p:style>
           <a:lnRef idx="2">
@@ -3406,17 +3449,14 @@
         </p:nvSpPr>
         <p:spPr>
           <a:xfrm>
-            <a:off x="281940" y="1102360"/>
+            <a:off x="0" y="2713355"/>
             <a:ext cx="2538730" cy="1610995"/>
           </a:xfrm>
           <a:prstGeom prst="rect">
             <a:avLst/>
           </a:prstGeom>
           <a:solidFill>
-            <a:schemeClr val="accent1">
-              <a:lumMod val="20000"/>
-              <a:lumOff val="80000"/>
-            </a:schemeClr>
+            <a:schemeClr val="bg1"/>
           </a:solidFill>
         </p:spPr>
         <p:style>
@@ -3459,31 +3499,31 @@
       </p:sp>
       <p:cxnSp>
         <p:nvCxnSpPr>
-          <p:cNvPr id="41" name="Straight Arrow Connector 40"/>
+          <p:cNvPr id="3" name="Straight Arrow Connector 2"/>
           <p:cNvCxnSpPr/>
           <p:nvPr/>
         </p:nvCxnSpPr>
         <p:spPr>
           <a:xfrm>
-            <a:off x="1535430" y="2780030"/>
-            <a:ext cx="31750" cy="2293620"/>
+            <a:off x="2538730" y="3519170"/>
+            <a:ext cx="650875" cy="0"/>
           </a:xfrm>
           <a:prstGeom prst="straightConnector1">
             <a:avLst/>
           </a:prstGeom>
           <a:ln>
-            <a:tailEnd type="arrow"/>
+            <a:tailEnd type="arrow" w="med" len="med"/>
           </a:ln>
         </p:spPr>
         <p:style>
           <a:lnRef idx="1">
-            <a:schemeClr val="accent1"/>
+            <a:schemeClr val="dk1"/>
           </a:lnRef>
           <a:fillRef idx="0">
-            <a:schemeClr val="accent1"/>
+            <a:schemeClr val="dk1"/>
           </a:fillRef>
           <a:effectRef idx="0">
-            <a:schemeClr val="accent1"/>
+            <a:schemeClr val="dk1"/>
           </a:effectRef>
           <a:fontRef idx="minor">
             <a:schemeClr val="tx1"/>
@@ -3492,31 +3532,31 @@
       </p:cxnSp>
       <p:cxnSp>
         <p:nvCxnSpPr>
-          <p:cNvPr id="46" name="Straight Arrow Connector 45"/>
+          <p:cNvPr id="4" name="Straight Arrow Connector 3"/>
           <p:cNvCxnSpPr/>
           <p:nvPr/>
         </p:nvCxnSpPr>
         <p:spPr>
-          <a:xfrm flipV="1">
-            <a:off x="2922270" y="3769360"/>
-            <a:ext cx="2623820" cy="2058670"/>
+          <a:xfrm>
+            <a:off x="5728335" y="3518535"/>
+            <a:ext cx="635000" cy="0"/>
           </a:xfrm>
           <a:prstGeom prst="straightConnector1">
             <a:avLst/>
           </a:prstGeom>
           <a:ln>
-            <a:tailEnd type="arrow"/>
+            <a:tailEnd type="arrow" w="med" len="med"/>
           </a:ln>
         </p:spPr>
         <p:style>
           <a:lnRef idx="1">
-            <a:schemeClr val="accent1"/>
+            <a:schemeClr val="dk1"/>
           </a:lnRef>
           <a:fillRef idx="0">
-            <a:schemeClr val="accent1"/>
+            <a:schemeClr val="dk1"/>
           </a:fillRef>
           <a:effectRef idx="0">
-            <a:schemeClr val="accent1"/>
+            <a:schemeClr val="dk1"/>
           </a:effectRef>
           <a:fontRef idx="minor">
             <a:schemeClr val="tx1"/>
@@ -3525,31 +3565,31 @@
       </p:cxnSp>
       <p:cxnSp>
         <p:nvCxnSpPr>
-          <p:cNvPr id="47" name="Straight Arrow Connector 46"/>
+          <p:cNvPr id="7" name="Straight Arrow Connector 6"/>
           <p:cNvCxnSpPr/>
           <p:nvPr/>
         </p:nvCxnSpPr>
         <p:spPr>
           <a:xfrm>
-            <a:off x="8244840" y="3855085"/>
-            <a:ext cx="1034415" cy="1471930"/>
+            <a:off x="8902065" y="3518535"/>
+            <a:ext cx="635000" cy="0"/>
           </a:xfrm>
           <a:prstGeom prst="straightConnector1">
             <a:avLst/>
           </a:prstGeom>
           <a:ln>
-            <a:tailEnd type="arrow"/>
+            <a:tailEnd type="arrow" w="med" len="med"/>
           </a:ln>
         </p:spPr>
         <p:style>
           <a:lnRef idx="1">
-            <a:schemeClr val="accent1"/>
+            <a:schemeClr val="dk1"/>
           </a:lnRef>
           <a:fillRef idx="0">
-            <a:schemeClr val="accent1"/>
+            <a:schemeClr val="dk1"/>
           </a:fillRef>
           <a:effectRef idx="0">
-            <a:schemeClr val="accent1"/>
+            <a:schemeClr val="dk1"/>
           </a:effectRef>
           <a:fontRef idx="minor">
             <a:schemeClr val="tx1"/>
@@ -3731,41 +3771,71 @@
         </p:nvSpPr>
         <p:spPr>
           <a:xfrm>
-            <a:off x="4277360" y="249555"/>
-            <a:ext cx="4211320" cy="972185"/>
+            <a:off x="1964690" y="327660"/>
+            <a:ext cx="8263255" cy="1318260"/>
           </a:xfrm>
         </p:spPr>
         <p:txBody>
           <a:bodyPr/>
           <a:p>
             <a:r>
-              <a:rPr lang="en-US"/>
-              <a:t>FLOW CHART</a:t>
-            </a:r>
-            <a:endParaRPr lang="en-US"/>
-          </a:p>
-        </p:txBody>
-      </p:sp>
-      <p:sp>
-        <p:nvSpPr>
-          <p:cNvPr id="11" name="Rectangles 10"/>
+              <a:rPr lang="en-US">
+                <a:solidFill>
+                  <a:schemeClr val="tx1"/>
+                </a:solidFill>
+                <a:effectLst>
+                  <a:outerShdw blurRad="38100" dist="19050" dir="2700000" algn="tl" rotWithShape="0">
+                    <a:schemeClr val="dk1">
+                      <a:alpha val="40000"/>
+                    </a:schemeClr>
+                  </a:outerShdw>
+                </a:effectLst>
+                <a:latin typeface="MS PGothic" panose="020B0600070205080204" charset="-128"/>
+                <a:ea typeface="MS PGothic" panose="020B0600070205080204" charset="-128"/>
+                <a:sym typeface="+mn-ea"/>
+              </a:rPr>
+              <a:t>COMPUTING FFT - Approach 1</a:t>
+            </a:r>
+            <a:endParaRPr lang="en-US">
+              <a:solidFill>
+                <a:schemeClr val="tx1"/>
+              </a:solidFill>
+              <a:effectLst>
+                <a:outerShdw blurRad="38100" dist="19050" dir="2700000" algn="tl" rotWithShape="0">
+                  <a:schemeClr val="dk1">
+                    <a:alpha val="40000"/>
+                  </a:schemeClr>
+                </a:outerShdw>
+              </a:effectLst>
+              <a:latin typeface="MS PGothic" panose="020B0600070205080204" charset="-128"/>
+              <a:ea typeface="MS PGothic" panose="020B0600070205080204" charset="-128"/>
+              <a:sym typeface="+mn-ea"/>
+            </a:endParaRPr>
+          </a:p>
+        </p:txBody>
+      </p:sp>
+      <p:sp>
+        <p:nvSpPr>
+          <p:cNvPr id="34" name="Rectangles 33"/>
           <p:cNvSpPr/>
           <p:nvPr/>
         </p:nvSpPr>
         <p:spPr>
           <a:xfrm>
-            <a:off x="9333230" y="2736215"/>
+            <a:off x="9537065" y="2713355"/>
             <a:ext cx="2538730" cy="1610995"/>
           </a:xfrm>
           <a:prstGeom prst="rect">
             <a:avLst/>
           </a:prstGeom>
           <a:solidFill>
-            <a:schemeClr val="accent5">
-              <a:lumMod val="20000"/>
-              <a:lumOff val="80000"/>
-            </a:schemeClr>
+            <a:schemeClr val="bg1"/>
           </a:solidFill>
+          <a:ln>
+            <a:solidFill>
+              <a:srgbClr val="92D050"/>
+            </a:solidFill>
+          </a:ln>
         </p:spPr>
         <p:style>
           <a:lnRef idx="2">
@@ -3794,7 +3864,7 @@
                 </a:solidFill>
                 <a:effectLst/>
               </a:rPr>
-              <a:t>include the path of the native libaray through Java build path</a:t>
+              <a:t>Write the output of the fftc1d function in a text file (*csv)</a:t>
             </a:r>
             <a:endParaRPr lang="en-US" b="1">
               <a:solidFill>
@@ -3807,24 +3877,26 @@
       </p:sp>
       <p:sp>
         <p:nvSpPr>
-          <p:cNvPr id="13" name="Rectangles 12"/>
+          <p:cNvPr id="37" name="Rectangles 36"/>
           <p:cNvSpPr/>
           <p:nvPr/>
         </p:nvSpPr>
         <p:spPr>
           <a:xfrm>
-            <a:off x="5039360" y="1711960"/>
+            <a:off x="4746625" y="2713355"/>
             <a:ext cx="2538730" cy="1610995"/>
           </a:xfrm>
           <a:prstGeom prst="rect">
             <a:avLst/>
           </a:prstGeom>
           <a:solidFill>
-            <a:schemeClr val="accent1">
-              <a:lumMod val="20000"/>
-              <a:lumOff val="80000"/>
-            </a:schemeClr>
+            <a:schemeClr val="bg1"/>
           </a:solidFill>
+          <a:ln>
+            <a:solidFill>
+              <a:srgbClr val="00B0F0"/>
+            </a:solidFill>
+          </a:ln>
         </p:spPr>
         <p:style>
           <a:lnRef idx="2">
@@ -3853,7 +3925,7 @@
                 </a:solidFill>
                 <a:effectLst/>
               </a:rPr>
-              <a:t>create a java file and add the JNI code</a:t>
+              <a:t>fftc1d takes a char array to compute FFT</a:t>
             </a:r>
             <a:endParaRPr lang="en-US" b="1">
               <a:solidFill>
@@ -3866,23 +3938,20 @@
       </p:sp>
       <p:sp>
         <p:nvSpPr>
-          <p:cNvPr id="14" name="Rectangles 13"/>
+          <p:cNvPr id="38" name="Rectangles 37"/>
           <p:cNvSpPr/>
           <p:nvPr/>
         </p:nvSpPr>
         <p:spPr>
           <a:xfrm>
-            <a:off x="404495" y="4687570"/>
+            <a:off x="151130" y="2713355"/>
             <a:ext cx="2538730" cy="1610995"/>
           </a:xfrm>
           <a:prstGeom prst="rect">
             <a:avLst/>
           </a:prstGeom>
           <a:solidFill>
-            <a:schemeClr val="accent1">
-              <a:lumMod val="20000"/>
-              <a:lumOff val="80000"/>
-            </a:schemeClr>
+            <a:schemeClr val="bg1"/>
           </a:solidFill>
         </p:spPr>
         <p:style>
@@ -3911,9 +3980,8 @@
                   <a:schemeClr val="tx1"/>
                 </a:solidFill>
                 <a:effectLst/>
-                <a:sym typeface="+mn-ea"/>
               </a:rPr>
-              <a:t>implementation the JNI code in .h file </a:t>
+              <a:t>Found the FFT function: void fftc1d(complex_1d_array &amp;a)</a:t>
             </a:r>
             <a:endParaRPr lang="en-US" b="1">
               <a:solidFill>
@@ -3924,159 +3992,33 @@
           </a:p>
         </p:txBody>
       </p:sp>
-      <p:sp>
-        <p:nvSpPr>
-          <p:cNvPr id="15" name="Rectangles 14"/>
-          <p:cNvSpPr/>
-          <p:nvPr/>
-        </p:nvSpPr>
-        <p:spPr>
-          <a:xfrm>
-            <a:off x="5039995" y="4687570"/>
-            <a:ext cx="2538730" cy="1771015"/>
-          </a:xfrm>
-          <a:prstGeom prst="rect">
-            <a:avLst/>
-          </a:prstGeom>
-          <a:solidFill>
-            <a:schemeClr val="accent5">
-              <a:lumMod val="20000"/>
-              <a:lumOff val="80000"/>
-            </a:schemeClr>
-          </a:solidFill>
-        </p:spPr>
-        <p:style>
-          <a:lnRef idx="2">
-            <a:schemeClr val="dk1">
-              <a:shade val="50000"/>
-            </a:schemeClr>
-          </a:lnRef>
-          <a:fillRef idx="1">
-            <a:schemeClr val="dk1"/>
-          </a:fillRef>
-          <a:effectRef idx="0">
-            <a:schemeClr val="dk1"/>
-          </a:effectRef>
-          <a:fontRef idx="minor">
-            <a:schemeClr val="lt1"/>
-          </a:fontRef>
-        </p:style>
-        <p:txBody>
-          <a:bodyPr rtlCol="0" anchor="ctr"/>
-          <a:p>
-            <a:pPr algn="ctr"/>
-            <a:r>
-              <a:rPr lang="en-US" b="1">
-                <a:solidFill>
-                  <a:schemeClr val="tx1"/>
-                </a:solidFill>
-                <a:effectLst/>
-              </a:rPr>
-              <a:t>Link Java header files through dll properties in VC++ Directories</a:t>
-            </a:r>
-            <a:endParaRPr lang="en-US" b="1">
-              <a:solidFill>
-                <a:schemeClr val="tx1"/>
-              </a:solidFill>
-              <a:effectLst/>
-            </a:endParaRPr>
-          </a:p>
-        </p:txBody>
-      </p:sp>
-      <p:sp>
-        <p:nvSpPr>
-          <p:cNvPr id="16" name="Rectangles 15"/>
-          <p:cNvSpPr/>
-          <p:nvPr/>
-        </p:nvSpPr>
-        <p:spPr>
-          <a:xfrm>
-            <a:off x="404495" y="1295400"/>
-            <a:ext cx="2891155" cy="1610995"/>
-          </a:xfrm>
-          <a:prstGeom prst="rect">
-            <a:avLst/>
-          </a:prstGeom>
-          <a:solidFill>
-            <a:schemeClr val="accent1">
-              <a:lumMod val="20000"/>
-              <a:lumOff val="80000"/>
-            </a:schemeClr>
-          </a:solidFill>
-        </p:spPr>
-        <p:style>
-          <a:lnRef idx="2">
-            <a:schemeClr val="dk1">
-              <a:shade val="50000"/>
-            </a:schemeClr>
-          </a:lnRef>
-          <a:fillRef idx="1">
-            <a:schemeClr val="dk1"/>
-          </a:fillRef>
-          <a:effectRef idx="0">
-            <a:schemeClr val="dk1"/>
-          </a:effectRef>
-          <a:fontRef idx="minor">
-            <a:schemeClr val="lt1"/>
-          </a:fontRef>
-        </p:style>
-        <p:txBody>
-          <a:bodyPr rtlCol="0" anchor="ctr"/>
-          <a:p>
-            <a:pPr algn="ctr"/>
-            <a:r>
-              <a:rPr lang="en-US" b="1">
-                <a:solidFill>
-                  <a:schemeClr val="tx1"/>
-                </a:solidFill>
-                <a:effectLst/>
-              </a:rPr>
-              <a:t>Create a DLL file with .cpp implementation</a:t>
-            </a:r>
-            <a:br>
-              <a:rPr lang="en-US" b="1">
-                <a:solidFill>
-                  <a:schemeClr val="tx1"/>
-                </a:solidFill>
-                <a:effectLst/>
-              </a:rPr>
-            </a:br>
-            <a:endParaRPr lang="en-US" b="1">
-              <a:solidFill>
-                <a:schemeClr val="tx1"/>
-              </a:solidFill>
-              <a:effectLst/>
-            </a:endParaRPr>
-          </a:p>
-        </p:txBody>
-      </p:sp>
       <p:cxnSp>
         <p:nvCxnSpPr>
-          <p:cNvPr id="22" name="Straight Arrow Connector 21"/>
+          <p:cNvPr id="3" name="Straight Arrow Connector 2"/>
           <p:cNvCxnSpPr/>
           <p:nvPr/>
         </p:nvCxnSpPr>
         <p:spPr>
           <a:xfrm flipV="1">
-            <a:off x="3018155" y="5476875"/>
-            <a:ext cx="1871980" cy="32385"/>
+            <a:off x="2745105" y="3513455"/>
+            <a:ext cx="1913890" cy="10160"/>
           </a:xfrm>
           <a:prstGeom prst="straightConnector1">
             <a:avLst/>
           </a:prstGeom>
           <a:ln>
-            <a:tailEnd type="arrow"/>
+            <a:tailEnd type="arrow" w="med" len="med"/>
           </a:ln>
         </p:spPr>
         <p:style>
           <a:lnRef idx="1">
-            <a:schemeClr val="accent1"/>
+            <a:schemeClr val="dk1"/>
           </a:lnRef>
           <a:fillRef idx="0">
-            <a:schemeClr val="accent1"/>
+            <a:schemeClr val="dk1"/>
           </a:fillRef>
           <a:effectRef idx="0">
-            <a:schemeClr val="accent1"/>
+            <a:schemeClr val="dk1"/>
           </a:effectRef>
           <a:fontRef idx="minor">
             <a:schemeClr val="tx1"/>
@@ -4085,31 +4027,389 @@
       </p:cxnSp>
       <p:cxnSp>
         <p:nvCxnSpPr>
-          <p:cNvPr id="23" name="Straight Arrow Connector 22"/>
-          <p:cNvCxnSpPr/>
+          <p:cNvPr id="4" name="Straight Arrow Connector 3"/>
+          <p:cNvCxnSpPr>
+            <a:stCxn id="37" idx="3"/>
+            <a:endCxn id="34" idx="1"/>
+          </p:cNvCxnSpPr>
           <p:nvPr/>
         </p:nvCxnSpPr>
         <p:spPr>
-          <a:xfrm flipH="1" flipV="1">
-            <a:off x="6292850" y="3397250"/>
-            <a:ext cx="32385" cy="1152525"/>
+          <a:xfrm>
+            <a:off x="7285355" y="3519170"/>
+            <a:ext cx="2251710" cy="0"/>
           </a:xfrm>
           <a:prstGeom prst="straightConnector1">
             <a:avLst/>
           </a:prstGeom>
           <a:ln>
-            <a:tailEnd type="arrow"/>
+            <a:tailEnd type="arrow" w="med" len="med"/>
           </a:ln>
         </p:spPr>
         <p:style>
           <a:lnRef idx="1">
-            <a:schemeClr val="accent1"/>
+            <a:schemeClr val="dk1"/>
           </a:lnRef>
           <a:fillRef idx="0">
-            <a:schemeClr val="accent1"/>
+            <a:schemeClr val="dk1"/>
           </a:fillRef>
           <a:effectRef idx="0">
-            <a:schemeClr val="accent1"/>
+            <a:schemeClr val="dk1"/>
+          </a:effectRef>
+          <a:fontRef idx="minor">
+            <a:schemeClr val="tx1"/>
+          </a:fontRef>
+        </p:style>
+      </p:cxnSp>
+    </p:spTree>
+  </p:cSld>
+  <p:clrMapOvr>
+    <a:masterClrMapping/>
+  </p:clrMapOvr>
+</p:sld>
+</file>
+
+<file path=ppt/slides/slide5.xml><?xml version="1.0" encoding="utf-8"?>
+<p:sld xmlns:a="http://schemas.openxmlformats.org/drawingml/2006/main" xmlns:r="http://schemas.openxmlformats.org/officeDocument/2006/relationships" xmlns:p="http://schemas.openxmlformats.org/presentationml/2006/main">
+  <p:cSld>
+    <p:spTree>
+      <p:nvGrpSpPr>
+        <p:cNvPr id="1" name=""/>
+        <p:cNvGrpSpPr/>
+        <p:nvPr/>
+      </p:nvGrpSpPr>
+      <p:grpSpPr/>
+      <p:sp>
+        <p:nvSpPr>
+          <p:cNvPr id="2" name="Title 1"/>
+          <p:cNvSpPr>
+            <a:spLocks noGrp="1"/>
+          </p:cNvSpPr>
+          <p:nvPr>
+            <p:ph type="title"/>
+          </p:nvPr>
+        </p:nvSpPr>
+        <p:spPr>
+          <a:xfrm>
+            <a:off x="698500" y="360045"/>
+            <a:ext cx="10694670" cy="1318260"/>
+          </a:xfrm>
+        </p:spPr>
+        <p:txBody>
+          <a:bodyPr/>
+          <a:p>
+            <a:r>
+              <a:rPr lang="en-US">
+                <a:solidFill>
+                  <a:schemeClr val="tx1"/>
+                </a:solidFill>
+                <a:effectLst>
+                  <a:outerShdw blurRad="38100" dist="19050" dir="2700000" algn="tl" rotWithShape="0">
+                    <a:schemeClr val="dk1">
+                      <a:alpha val="40000"/>
+                    </a:schemeClr>
+                  </a:outerShdw>
+                </a:effectLst>
+                <a:latin typeface="MS PGothic" panose="020B0600070205080204" charset="-128"/>
+                <a:ea typeface="MS PGothic" panose="020B0600070205080204" charset="-128"/>
+                <a:sym typeface="+mn-ea"/>
+              </a:rPr>
+              <a:t>EXPOSING C++ API TO JAVA - Approach 1</a:t>
+            </a:r>
+            <a:endParaRPr lang="en-US">
+              <a:solidFill>
+                <a:schemeClr val="tx1"/>
+              </a:solidFill>
+              <a:effectLst>
+                <a:outerShdw blurRad="38100" dist="19050" dir="2700000" algn="tl" rotWithShape="0">
+                  <a:schemeClr val="dk1">
+                    <a:alpha val="40000"/>
+                  </a:schemeClr>
+                </a:outerShdw>
+              </a:effectLst>
+              <a:latin typeface="MS PGothic" panose="020B0600070205080204" charset="-128"/>
+              <a:ea typeface="MS PGothic" panose="020B0600070205080204" charset="-128"/>
+              <a:sym typeface="+mn-ea"/>
+            </a:endParaRPr>
+          </a:p>
+        </p:txBody>
+      </p:sp>
+      <p:sp>
+        <p:nvSpPr>
+          <p:cNvPr id="34" name="Rectangles 33"/>
+          <p:cNvSpPr/>
+          <p:nvPr/>
+        </p:nvSpPr>
+        <p:spPr>
+          <a:xfrm>
+            <a:off x="9440545" y="4569460"/>
+            <a:ext cx="2538730" cy="1610995"/>
+          </a:xfrm>
+          <a:prstGeom prst="rect">
+            <a:avLst/>
+          </a:prstGeom>
+          <a:solidFill>
+            <a:schemeClr val="bg1"/>
+          </a:solidFill>
+          <a:ln>
+            <a:solidFill>
+              <a:srgbClr val="92D050"/>
+            </a:solidFill>
+          </a:ln>
+        </p:spPr>
+        <p:style>
+          <a:lnRef idx="2">
+            <a:schemeClr val="dk1">
+              <a:shade val="50000"/>
+            </a:schemeClr>
+          </a:lnRef>
+          <a:fillRef idx="1">
+            <a:schemeClr val="dk1"/>
+          </a:fillRef>
+          <a:effectRef idx="0">
+            <a:schemeClr val="dk1"/>
+          </a:effectRef>
+          <a:fontRef idx="minor">
+            <a:schemeClr val="lt1"/>
+          </a:fontRef>
+        </p:style>
+        <p:txBody>
+          <a:bodyPr rtlCol="0" anchor="ctr"/>
+          <a:p>
+            <a:pPr algn="ctr"/>
+            <a:r>
+              <a:rPr lang="en-US" b="1">
+                <a:solidFill>
+                  <a:schemeClr val="tx1"/>
+                </a:solidFill>
+                <a:effectLst/>
+              </a:rPr>
+              <a:t>Output: C++ code runing in Java enviroment</a:t>
+            </a:r>
+            <a:endParaRPr lang="en-US" b="1">
+              <a:solidFill>
+                <a:schemeClr val="tx1"/>
+              </a:solidFill>
+              <a:effectLst/>
+            </a:endParaRPr>
+          </a:p>
+        </p:txBody>
+      </p:sp>
+      <p:sp>
+        <p:nvSpPr>
+          <p:cNvPr id="36" name="Rectangles 35"/>
+          <p:cNvSpPr/>
+          <p:nvPr/>
+        </p:nvSpPr>
+        <p:spPr>
+          <a:xfrm>
+            <a:off x="6438900" y="2192655"/>
+            <a:ext cx="2538730" cy="1610995"/>
+          </a:xfrm>
+          <a:prstGeom prst="rect">
+            <a:avLst/>
+          </a:prstGeom>
+          <a:noFill/>
+          <a:ln>
+            <a:solidFill>
+              <a:srgbClr val="00B0F0"/>
+            </a:solidFill>
+          </a:ln>
+          <a:extLst>
+            <a:ext uri="{909E8E84-426E-40DD-AFC4-6F175D3DCCD1}">
+              <a14:hiddenFill xmlns:a14="http://schemas.microsoft.com/office/drawing/2010/main">
+                <a:solidFill>
+                  <a:schemeClr val="accent1">
+                    <a:lumMod val="20000"/>
+                    <a:lumOff val="80000"/>
+                  </a:schemeClr>
+                </a:solidFill>
+              </a14:hiddenFill>
+            </a:ext>
+          </a:extLst>
+        </p:spPr>
+        <p:style>
+          <a:lnRef idx="2">
+            <a:schemeClr val="dk1">
+              <a:shade val="50000"/>
+            </a:schemeClr>
+          </a:lnRef>
+          <a:fillRef idx="1">
+            <a:schemeClr val="dk1"/>
+          </a:fillRef>
+          <a:effectRef idx="0">
+            <a:schemeClr val="dk1"/>
+          </a:effectRef>
+          <a:fontRef idx="minor">
+            <a:schemeClr val="lt1"/>
+          </a:fontRef>
+        </p:style>
+        <p:txBody>
+          <a:bodyPr rtlCol="0" anchor="ctr"/>
+          <a:p>
+            <a:pPr algn="ctr"/>
+            <a:r>
+              <a:rPr lang="en-US" b="1">
+                <a:solidFill>
+                  <a:schemeClr val="tx1"/>
+                </a:solidFill>
+                <a:effectLst/>
+              </a:rPr>
+              <a:t>Java compiler loads native library</a:t>
+            </a:r>
+            <a:endParaRPr lang="en-US" b="1">
+              <a:solidFill>
+                <a:schemeClr val="tx1"/>
+              </a:solidFill>
+              <a:effectLst/>
+            </a:endParaRPr>
+          </a:p>
+        </p:txBody>
+      </p:sp>
+      <p:sp>
+        <p:nvSpPr>
+          <p:cNvPr id="37" name="Rectangles 36"/>
+          <p:cNvSpPr/>
+          <p:nvPr/>
+        </p:nvSpPr>
+        <p:spPr>
+          <a:xfrm>
+            <a:off x="3268345" y="2192655"/>
+            <a:ext cx="2538730" cy="1610995"/>
+          </a:xfrm>
+          <a:prstGeom prst="rect">
+            <a:avLst/>
+          </a:prstGeom>
+          <a:solidFill>
+            <a:schemeClr val="bg1"/>
+          </a:solidFill>
+          <a:ln>
+            <a:solidFill>
+              <a:srgbClr val="00B0F0"/>
+            </a:solidFill>
+          </a:ln>
+        </p:spPr>
+        <p:style>
+          <a:lnRef idx="2">
+            <a:schemeClr val="dk1">
+              <a:shade val="50000"/>
+            </a:schemeClr>
+          </a:lnRef>
+          <a:fillRef idx="1">
+            <a:schemeClr val="dk1"/>
+          </a:fillRef>
+          <a:effectRef idx="0">
+            <a:schemeClr val="dk1"/>
+          </a:effectRef>
+          <a:fontRef idx="minor">
+            <a:schemeClr val="lt1"/>
+          </a:fontRef>
+        </p:style>
+        <p:txBody>
+          <a:bodyPr rtlCol="0" anchor="ctr"/>
+          <a:p>
+            <a:pPr algn="ctr"/>
+            <a:r>
+              <a:rPr lang="en-US" b="1">
+                <a:solidFill>
+                  <a:schemeClr val="tx1"/>
+                </a:solidFill>
+                <a:effectLst/>
+              </a:rPr>
+              <a:t>JNIEXPORT and JNICALL produce a C++ code in native methode</a:t>
+            </a:r>
+            <a:endParaRPr lang="en-US" b="1">
+              <a:solidFill>
+                <a:schemeClr val="tx1"/>
+              </a:solidFill>
+              <a:effectLst/>
+            </a:endParaRPr>
+          </a:p>
+        </p:txBody>
+      </p:sp>
+      <p:sp>
+        <p:nvSpPr>
+          <p:cNvPr id="38" name="Rectangles 37"/>
+          <p:cNvSpPr/>
+          <p:nvPr/>
+        </p:nvSpPr>
+        <p:spPr>
+          <a:xfrm>
+            <a:off x="101600" y="2192655"/>
+            <a:ext cx="2538730" cy="1610995"/>
+          </a:xfrm>
+          <a:prstGeom prst="rect">
+            <a:avLst/>
+          </a:prstGeom>
+          <a:solidFill>
+            <a:schemeClr val="bg1"/>
+          </a:solidFill>
+        </p:spPr>
+        <p:style>
+          <a:lnRef idx="2">
+            <a:schemeClr val="dk1">
+              <a:shade val="50000"/>
+            </a:schemeClr>
+          </a:lnRef>
+          <a:fillRef idx="1">
+            <a:schemeClr val="dk1"/>
+          </a:fillRef>
+          <a:effectRef idx="0">
+            <a:schemeClr val="dk1"/>
+          </a:effectRef>
+          <a:fontRef idx="minor">
+            <a:schemeClr val="lt1"/>
+          </a:fontRef>
+        </p:style>
+        <p:txBody>
+          <a:bodyPr rtlCol="0" anchor="ctr"/>
+          <a:p>
+            <a:pPr algn="ctr"/>
+            <a:r>
+              <a:rPr lang="en-US" b="1">
+                <a:solidFill>
+                  <a:schemeClr val="tx1"/>
+                </a:solidFill>
+                <a:effectLst/>
+              </a:rPr>
+              <a:t>Input: A C++ implementation code</a:t>
+            </a:r>
+            <a:endParaRPr lang="en-US" b="1">
+              <a:solidFill>
+                <a:schemeClr val="tx1"/>
+              </a:solidFill>
+              <a:effectLst/>
+            </a:endParaRPr>
+          </a:p>
+        </p:txBody>
+      </p:sp>
+      <p:cxnSp>
+        <p:nvCxnSpPr>
+          <p:cNvPr id="3" name="Straight Arrow Connector 2"/>
+          <p:cNvCxnSpPr/>
+          <p:nvPr/>
+        </p:nvCxnSpPr>
+        <p:spPr>
+          <a:xfrm>
+            <a:off x="2626995" y="2998470"/>
+            <a:ext cx="650875" cy="0"/>
+          </a:xfrm>
+          <a:prstGeom prst="straightConnector1">
+            <a:avLst/>
+          </a:prstGeom>
+          <a:ln>
+            <a:tailEnd type="arrow" w="med" len="med"/>
+          </a:ln>
+        </p:spPr>
+        <p:style>
+          <a:lnRef idx="1">
+            <a:schemeClr val="dk1"/>
+          </a:lnRef>
+          <a:fillRef idx="0">
+            <a:schemeClr val="dk1"/>
+          </a:fillRef>
+          <a:effectRef idx="0">
+            <a:schemeClr val="dk1"/>
           </a:effectRef>
           <a:fontRef idx="minor">
             <a:schemeClr val="tx1"/>
@@ -4118,33 +4418,31 @@
       </p:cxnSp>
       <p:cxnSp>
         <p:nvCxnSpPr>
-          <p:cNvPr id="24" name="Elbow Connector 23"/>
+          <p:cNvPr id="4" name="Straight Arrow Connector 3"/>
           <p:cNvCxnSpPr/>
           <p:nvPr/>
         </p:nvCxnSpPr>
         <p:spPr>
           <a:xfrm>
-            <a:off x="7658100" y="2452370"/>
-            <a:ext cx="1514475" cy="1024255"/>
-          </a:xfrm>
-          <a:prstGeom prst="bentConnector3">
-            <a:avLst>
-              <a:gd name="adj1" fmla="val 50021"/>
-            </a:avLst>
+            <a:off x="5794375" y="2998470"/>
+            <a:ext cx="635000" cy="0"/>
+          </a:xfrm>
+          <a:prstGeom prst="straightConnector1">
+            <a:avLst/>
           </a:prstGeom>
           <a:ln>
-            <a:tailEnd type="arrow"/>
+            <a:tailEnd type="arrow" w="med" len="med"/>
           </a:ln>
         </p:spPr>
         <p:style>
           <a:lnRef idx="1">
-            <a:schemeClr val="accent1"/>
+            <a:schemeClr val="dk1"/>
           </a:lnRef>
           <a:fillRef idx="0">
-            <a:schemeClr val="accent1"/>
+            <a:schemeClr val="dk1"/>
           </a:fillRef>
           <a:effectRef idx="0">
-            <a:schemeClr val="accent1"/>
+            <a:schemeClr val="dk1"/>
           </a:effectRef>
           <a:fontRef idx="minor">
             <a:schemeClr val="tx1"/>
@@ -4153,37 +4451,1765 @@
       </p:cxnSp>
       <p:cxnSp>
         <p:nvCxnSpPr>
-          <p:cNvPr id="25" name="Straight Arrow Connector 24"/>
+          <p:cNvPr id="7" name="Straight Arrow Connector 6"/>
           <p:cNvCxnSpPr/>
           <p:nvPr/>
         </p:nvCxnSpPr>
         <p:spPr>
-          <a:xfrm flipH="1">
-            <a:off x="1727200" y="2996565"/>
-            <a:ext cx="43180" cy="1546860"/>
+          <a:xfrm>
+            <a:off x="8968105" y="2998470"/>
+            <a:ext cx="635000" cy="0"/>
           </a:xfrm>
           <a:prstGeom prst="straightConnector1">
             <a:avLst/>
           </a:prstGeom>
           <a:ln>
-            <a:tailEnd type="arrow"/>
+            <a:tailEnd type="arrow" w="med" len="med"/>
           </a:ln>
         </p:spPr>
         <p:style>
           <a:lnRef idx="1">
-            <a:schemeClr val="accent1"/>
+            <a:schemeClr val="dk1"/>
           </a:lnRef>
           <a:fillRef idx="0">
-            <a:schemeClr val="accent1"/>
+            <a:schemeClr val="dk1"/>
           </a:fillRef>
           <a:effectRef idx="0">
-            <a:schemeClr val="accent1"/>
+            <a:schemeClr val="dk1"/>
           </a:effectRef>
           <a:fontRef idx="minor">
             <a:schemeClr val="tx1"/>
           </a:fontRef>
         </p:style>
       </p:cxnSp>
+      <p:sp>
+        <p:nvSpPr>
+          <p:cNvPr id="5" name="Rectangles 4"/>
+          <p:cNvSpPr/>
+          <p:nvPr/>
+        </p:nvSpPr>
+        <p:spPr>
+          <a:xfrm>
+            <a:off x="9590405" y="2192655"/>
+            <a:ext cx="2538730" cy="1610995"/>
+          </a:xfrm>
+          <a:prstGeom prst="rect">
+            <a:avLst/>
+          </a:prstGeom>
+          <a:noFill/>
+          <a:ln>
+            <a:solidFill>
+              <a:srgbClr val="00B0F0"/>
+            </a:solidFill>
+          </a:ln>
+          <a:extLst>
+            <a:ext uri="{909E8E84-426E-40DD-AFC4-6F175D3DCCD1}">
+              <a14:hiddenFill xmlns:a14="http://schemas.microsoft.com/office/drawing/2010/main">
+                <a:solidFill>
+                  <a:schemeClr val="accent1">
+                    <a:lumMod val="20000"/>
+                    <a:lumOff val="80000"/>
+                  </a:schemeClr>
+                </a:solidFill>
+              </a14:hiddenFill>
+            </a:ext>
+          </a:extLst>
+        </p:spPr>
+        <p:style>
+          <a:lnRef idx="2">
+            <a:schemeClr val="dk1">
+              <a:shade val="50000"/>
+            </a:schemeClr>
+          </a:lnRef>
+          <a:fillRef idx="1">
+            <a:schemeClr val="dk1"/>
+          </a:fillRef>
+          <a:effectRef idx="0">
+            <a:schemeClr val="dk1"/>
+          </a:effectRef>
+          <a:fontRef idx="minor">
+            <a:schemeClr val="lt1"/>
+          </a:fontRef>
+        </p:style>
+        <p:txBody>
+          <a:bodyPr rtlCol="0" anchor="ctr"/>
+          <a:p>
+            <a:pPr algn="ctr"/>
+            <a:r>
+              <a:rPr lang="en-US" b="1">
+                <a:solidFill>
+                  <a:schemeClr val="tx1"/>
+                </a:solidFill>
+                <a:effectLst/>
+              </a:rPr>
+              <a:t>Creates and invokes the native methode</a:t>
+            </a:r>
+            <a:endParaRPr lang="en-US" b="1">
+              <a:solidFill>
+                <a:schemeClr val="tx1"/>
+              </a:solidFill>
+              <a:effectLst/>
+            </a:endParaRPr>
+          </a:p>
+        </p:txBody>
+      </p:sp>
+      <p:cxnSp>
+        <p:nvCxnSpPr>
+          <p:cNvPr id="6" name="Straight Arrow Connector 5"/>
+          <p:cNvCxnSpPr/>
+          <p:nvPr/>
+        </p:nvCxnSpPr>
+        <p:spPr>
+          <a:xfrm>
+            <a:off x="10704830" y="3852545"/>
+            <a:ext cx="10160" cy="678815"/>
+          </a:xfrm>
+          <a:prstGeom prst="straightConnector1">
+            <a:avLst/>
+          </a:prstGeom>
+          <a:ln>
+            <a:tailEnd type="arrow" w="med" len="med"/>
+          </a:ln>
+        </p:spPr>
+        <p:style>
+          <a:lnRef idx="1">
+            <a:schemeClr val="dk1"/>
+          </a:lnRef>
+          <a:fillRef idx="0">
+            <a:schemeClr val="dk1"/>
+          </a:fillRef>
+          <a:effectRef idx="0">
+            <a:schemeClr val="dk1"/>
+          </a:effectRef>
+          <a:fontRef idx="minor">
+            <a:schemeClr val="tx1"/>
+          </a:fontRef>
+        </p:style>
+      </p:cxnSp>
+      <p:sp>
+        <p:nvSpPr>
+          <p:cNvPr id="8" name="Rectangles 7"/>
+          <p:cNvSpPr/>
+          <p:nvPr/>
+        </p:nvSpPr>
+        <p:spPr>
+          <a:xfrm>
+            <a:off x="2809240" y="4980305"/>
+            <a:ext cx="2985135" cy="368300"/>
+          </a:xfrm>
+          <a:prstGeom prst="rect">
+            <a:avLst/>
+          </a:prstGeom>
+          <a:noFill/>
+          <a:ln w="9525">
+            <a:noFill/>
+          </a:ln>
+        </p:spPr>
+        <p:txBody>
+          <a:bodyPr vert="horz" wrap="square" rtlCol="0" anchor="ctr" anchorCtr="0"/>
+          <a:p>
+            <a:pPr lvl="0" algn="ctr" fontAlgn="base">
+              <a:buClrTx/>
+              <a:buSzTx/>
+              <a:buFontTx/>
+            </a:pPr>
+            <a:r>
+              <a:rPr lang="en-US" sz="3200">
+                <a:effectLst>
+                  <a:outerShdw blurRad="38100" dist="19050" dir="2700000" algn="tl" rotWithShape="0">
+                    <a:schemeClr val="dk1">
+                      <a:alpha val="40000"/>
+                    </a:schemeClr>
+                  </a:outerShdw>
+                </a:effectLst>
+                <a:latin typeface="MS PGothic" panose="020B0600070205080204" charset="-128"/>
+                <a:ea typeface="MS PGothic" panose="020B0600070205080204" charset="-128"/>
+                <a:cs typeface="+mj-cs"/>
+                <a:sym typeface="+mn-ea"/>
+              </a:rPr>
+              <a:t>Using JNI.h</a:t>
+            </a:r>
+            <a:endParaRPr lang="en-US" sz="3200">
+              <a:effectLst>
+                <a:outerShdw blurRad="38100" dist="19050" dir="2700000" algn="tl" rotWithShape="0">
+                  <a:schemeClr val="dk1">
+                    <a:alpha val="40000"/>
+                  </a:schemeClr>
+                </a:outerShdw>
+              </a:effectLst>
+              <a:latin typeface="MS PGothic" panose="020B0600070205080204" charset="-128"/>
+              <a:ea typeface="MS PGothic" panose="020B0600070205080204" charset="-128"/>
+              <a:cs typeface="+mj-cs"/>
+              <a:sym typeface="+mn-ea"/>
+            </a:endParaRPr>
+          </a:p>
+        </p:txBody>
+      </p:sp>
+    </p:spTree>
+  </p:cSld>
+  <p:clrMapOvr>
+    <a:masterClrMapping/>
+  </p:clrMapOvr>
+</p:sld>
+</file>
+
+<file path=ppt/slides/slide6.xml><?xml version="1.0" encoding="utf-8"?>
+<p:sld xmlns:a="http://schemas.openxmlformats.org/drawingml/2006/main" xmlns:r="http://schemas.openxmlformats.org/officeDocument/2006/relationships" xmlns:p="http://schemas.openxmlformats.org/presentationml/2006/main">
+  <p:cSld>
+    <p:spTree>
+      <p:nvGrpSpPr>
+        <p:cNvPr id="1" name=""/>
+        <p:cNvGrpSpPr/>
+        <p:nvPr/>
+      </p:nvGrpSpPr>
+      <p:grpSpPr/>
+      <p:sp>
+        <p:nvSpPr>
+          <p:cNvPr id="2" name="Title 1"/>
+          <p:cNvSpPr>
+            <a:spLocks noGrp="1"/>
+          </p:cNvSpPr>
+          <p:nvPr>
+            <p:ph type="title"/>
+          </p:nvPr>
+        </p:nvSpPr>
+        <p:spPr>
+          <a:xfrm>
+            <a:off x="698500" y="360045"/>
+            <a:ext cx="10694670" cy="1318260"/>
+          </a:xfrm>
+        </p:spPr>
+        <p:txBody>
+          <a:bodyPr/>
+          <a:p>
+            <a:r>
+              <a:rPr lang="en-US">
+                <a:solidFill>
+                  <a:schemeClr val="tx1"/>
+                </a:solidFill>
+                <a:effectLst>
+                  <a:outerShdw blurRad="38100" dist="19050" dir="2700000" algn="tl" rotWithShape="0">
+                    <a:schemeClr val="dk1">
+                      <a:alpha val="40000"/>
+                    </a:schemeClr>
+                  </a:outerShdw>
+                </a:effectLst>
+                <a:latin typeface="MS PGothic" panose="020B0600070205080204" charset="-128"/>
+                <a:ea typeface="MS PGothic" panose="020B0600070205080204" charset="-128"/>
+                <a:sym typeface="+mn-ea"/>
+              </a:rPr>
+              <a:t>EXPOSING C++ API TO JAVA - Approach 2</a:t>
+            </a:r>
+            <a:endParaRPr lang="en-US">
+              <a:solidFill>
+                <a:schemeClr val="tx1"/>
+              </a:solidFill>
+              <a:effectLst>
+                <a:outerShdw blurRad="38100" dist="19050" dir="2700000" algn="tl" rotWithShape="0">
+                  <a:schemeClr val="dk1">
+                    <a:alpha val="40000"/>
+                  </a:schemeClr>
+                </a:outerShdw>
+              </a:effectLst>
+              <a:latin typeface="MS PGothic" panose="020B0600070205080204" charset="-128"/>
+              <a:ea typeface="MS PGothic" panose="020B0600070205080204" charset="-128"/>
+              <a:sym typeface="+mn-ea"/>
+            </a:endParaRPr>
+          </a:p>
+        </p:txBody>
+      </p:sp>
+      <p:sp>
+        <p:nvSpPr>
+          <p:cNvPr id="34" name="Rectangles 33"/>
+          <p:cNvSpPr/>
+          <p:nvPr/>
+        </p:nvSpPr>
+        <p:spPr>
+          <a:xfrm>
+            <a:off x="9440545" y="4569460"/>
+            <a:ext cx="2538730" cy="1610995"/>
+          </a:xfrm>
+          <a:prstGeom prst="rect">
+            <a:avLst/>
+          </a:prstGeom>
+          <a:solidFill>
+            <a:schemeClr val="bg1"/>
+          </a:solidFill>
+          <a:ln>
+            <a:solidFill>
+              <a:srgbClr val="92D050"/>
+            </a:solidFill>
+          </a:ln>
+        </p:spPr>
+        <p:style>
+          <a:lnRef idx="2">
+            <a:schemeClr val="dk1">
+              <a:shade val="50000"/>
+            </a:schemeClr>
+          </a:lnRef>
+          <a:fillRef idx="1">
+            <a:schemeClr val="dk1"/>
+          </a:fillRef>
+          <a:effectRef idx="0">
+            <a:schemeClr val="dk1"/>
+          </a:effectRef>
+          <a:fontRef idx="minor">
+            <a:schemeClr val="lt1"/>
+          </a:fontRef>
+        </p:style>
+        <p:txBody>
+          <a:bodyPr rtlCol="0" anchor="ctr"/>
+          <a:p>
+            <a:pPr algn="ctr"/>
+            <a:r>
+              <a:rPr lang="en-US" b="1">
+                <a:solidFill>
+                  <a:schemeClr val="tx1"/>
+                </a:solidFill>
+                <a:effectLst/>
+              </a:rPr>
+              <a:t>Output: C++ code runing in Java enviroment</a:t>
+            </a:r>
+            <a:endParaRPr lang="en-US" b="1">
+              <a:solidFill>
+                <a:schemeClr val="tx1"/>
+              </a:solidFill>
+              <a:effectLst/>
+            </a:endParaRPr>
+          </a:p>
+        </p:txBody>
+      </p:sp>
+      <p:sp>
+        <p:nvSpPr>
+          <p:cNvPr id="36" name="Rectangles 35"/>
+          <p:cNvSpPr/>
+          <p:nvPr/>
+        </p:nvSpPr>
+        <p:spPr>
+          <a:xfrm>
+            <a:off x="6438900" y="2192655"/>
+            <a:ext cx="2538730" cy="1610995"/>
+          </a:xfrm>
+          <a:prstGeom prst="rect">
+            <a:avLst/>
+          </a:prstGeom>
+          <a:noFill/>
+          <a:ln>
+            <a:solidFill>
+              <a:srgbClr val="00B0F0"/>
+            </a:solidFill>
+          </a:ln>
+          <a:extLst>
+            <a:ext uri="{909E8E84-426E-40DD-AFC4-6F175D3DCCD1}">
+              <a14:hiddenFill xmlns:a14="http://schemas.microsoft.com/office/drawing/2010/main">
+                <a:solidFill>
+                  <a:schemeClr val="accent1">
+                    <a:lumMod val="20000"/>
+                    <a:lumOff val="80000"/>
+                  </a:schemeClr>
+                </a:solidFill>
+              </a14:hiddenFill>
+            </a:ext>
+          </a:extLst>
+        </p:spPr>
+        <p:style>
+          <a:lnRef idx="2">
+            <a:schemeClr val="dk1">
+              <a:shade val="50000"/>
+            </a:schemeClr>
+          </a:lnRef>
+          <a:fillRef idx="1">
+            <a:schemeClr val="dk1"/>
+          </a:fillRef>
+          <a:effectRef idx="0">
+            <a:schemeClr val="dk1"/>
+          </a:effectRef>
+          <a:fontRef idx="minor">
+            <a:schemeClr val="lt1"/>
+          </a:fontRef>
+        </p:style>
+        <p:txBody>
+          <a:bodyPr rtlCol="0" anchor="ctr"/>
+          <a:p>
+            <a:pPr algn="ctr"/>
+            <a:r>
+              <a:rPr lang="en-US" b="1">
+                <a:solidFill>
+                  <a:schemeClr val="tx1"/>
+                </a:solidFill>
+                <a:effectLst/>
+              </a:rPr>
+              <a:t>Java compiler loads native library</a:t>
+            </a:r>
+            <a:endParaRPr lang="en-US" b="1">
+              <a:solidFill>
+                <a:schemeClr val="tx1"/>
+              </a:solidFill>
+              <a:effectLst/>
+            </a:endParaRPr>
+          </a:p>
+        </p:txBody>
+      </p:sp>
+      <p:sp>
+        <p:nvSpPr>
+          <p:cNvPr id="37" name="Rectangles 36"/>
+          <p:cNvSpPr/>
+          <p:nvPr/>
+        </p:nvSpPr>
+        <p:spPr>
+          <a:xfrm>
+            <a:off x="3268345" y="2192655"/>
+            <a:ext cx="2538730" cy="1610995"/>
+          </a:xfrm>
+          <a:prstGeom prst="rect">
+            <a:avLst/>
+          </a:prstGeom>
+          <a:solidFill>
+            <a:schemeClr val="bg1"/>
+          </a:solidFill>
+          <a:ln>
+            <a:solidFill>
+              <a:srgbClr val="00B0F0"/>
+            </a:solidFill>
+          </a:ln>
+        </p:spPr>
+        <p:style>
+          <a:lnRef idx="2">
+            <a:schemeClr val="dk1">
+              <a:shade val="50000"/>
+            </a:schemeClr>
+          </a:lnRef>
+          <a:fillRef idx="1">
+            <a:schemeClr val="dk1"/>
+          </a:fillRef>
+          <a:effectRef idx="0">
+            <a:schemeClr val="dk1"/>
+          </a:effectRef>
+          <a:fontRef idx="minor">
+            <a:schemeClr val="lt1"/>
+          </a:fontRef>
+        </p:style>
+        <p:txBody>
+          <a:bodyPr rtlCol="0" anchor="ctr"/>
+          <a:p>
+            <a:pPr algn="ctr"/>
+            <a:r>
+              <a:rPr lang="en-US" b="1">
+                <a:solidFill>
+                  <a:schemeClr val="tx1"/>
+                </a:solidFill>
+                <a:effectLst/>
+              </a:rPr>
+              <a:t>JNIEXPORT and JNICALL produce a C++ code in native methode</a:t>
+            </a:r>
+            <a:endParaRPr lang="en-US" b="1">
+              <a:solidFill>
+                <a:schemeClr val="tx1"/>
+              </a:solidFill>
+              <a:effectLst/>
+            </a:endParaRPr>
+          </a:p>
+        </p:txBody>
+      </p:sp>
+      <p:sp>
+        <p:nvSpPr>
+          <p:cNvPr id="38" name="Rectangles 37"/>
+          <p:cNvSpPr/>
+          <p:nvPr/>
+        </p:nvSpPr>
+        <p:spPr>
+          <a:xfrm>
+            <a:off x="101600" y="2192655"/>
+            <a:ext cx="2538730" cy="1610995"/>
+          </a:xfrm>
+          <a:prstGeom prst="rect">
+            <a:avLst/>
+          </a:prstGeom>
+          <a:solidFill>
+            <a:schemeClr val="bg1"/>
+          </a:solidFill>
+        </p:spPr>
+        <p:style>
+          <a:lnRef idx="2">
+            <a:schemeClr val="dk1">
+              <a:shade val="50000"/>
+            </a:schemeClr>
+          </a:lnRef>
+          <a:fillRef idx="1">
+            <a:schemeClr val="dk1"/>
+          </a:fillRef>
+          <a:effectRef idx="0">
+            <a:schemeClr val="dk1"/>
+          </a:effectRef>
+          <a:fontRef idx="minor">
+            <a:schemeClr val="lt1"/>
+          </a:fontRef>
+        </p:style>
+        <p:txBody>
+          <a:bodyPr rtlCol="0" anchor="ctr"/>
+          <a:p>
+            <a:pPr algn="ctr"/>
+            <a:r>
+              <a:rPr lang="en-US" b="1">
+                <a:solidFill>
+                  <a:schemeClr val="tx1"/>
+                </a:solidFill>
+                <a:effectLst/>
+              </a:rPr>
+              <a:t>Input: A C++ implementation code</a:t>
+            </a:r>
+            <a:endParaRPr lang="en-US" b="1">
+              <a:solidFill>
+                <a:schemeClr val="tx1"/>
+              </a:solidFill>
+              <a:effectLst/>
+            </a:endParaRPr>
+          </a:p>
+        </p:txBody>
+      </p:sp>
+      <p:cxnSp>
+        <p:nvCxnSpPr>
+          <p:cNvPr id="3" name="Straight Arrow Connector 2"/>
+          <p:cNvCxnSpPr/>
+          <p:nvPr/>
+        </p:nvCxnSpPr>
+        <p:spPr>
+          <a:xfrm>
+            <a:off x="2626995" y="2998470"/>
+            <a:ext cx="650875" cy="0"/>
+          </a:xfrm>
+          <a:prstGeom prst="straightConnector1">
+            <a:avLst/>
+          </a:prstGeom>
+          <a:ln>
+            <a:tailEnd type="arrow" w="med" len="med"/>
+          </a:ln>
+        </p:spPr>
+        <p:style>
+          <a:lnRef idx="1">
+            <a:schemeClr val="dk1"/>
+          </a:lnRef>
+          <a:fillRef idx="0">
+            <a:schemeClr val="dk1"/>
+          </a:fillRef>
+          <a:effectRef idx="0">
+            <a:schemeClr val="dk1"/>
+          </a:effectRef>
+          <a:fontRef idx="minor">
+            <a:schemeClr val="tx1"/>
+          </a:fontRef>
+        </p:style>
+      </p:cxnSp>
+      <p:cxnSp>
+        <p:nvCxnSpPr>
+          <p:cNvPr id="4" name="Straight Arrow Connector 3"/>
+          <p:cNvCxnSpPr/>
+          <p:nvPr/>
+        </p:nvCxnSpPr>
+        <p:spPr>
+          <a:xfrm>
+            <a:off x="5794375" y="2998470"/>
+            <a:ext cx="635000" cy="0"/>
+          </a:xfrm>
+          <a:prstGeom prst="straightConnector1">
+            <a:avLst/>
+          </a:prstGeom>
+          <a:ln>
+            <a:tailEnd type="arrow" w="med" len="med"/>
+          </a:ln>
+        </p:spPr>
+        <p:style>
+          <a:lnRef idx="1">
+            <a:schemeClr val="dk1"/>
+          </a:lnRef>
+          <a:fillRef idx="0">
+            <a:schemeClr val="dk1"/>
+          </a:fillRef>
+          <a:effectRef idx="0">
+            <a:schemeClr val="dk1"/>
+          </a:effectRef>
+          <a:fontRef idx="minor">
+            <a:schemeClr val="tx1"/>
+          </a:fontRef>
+        </p:style>
+      </p:cxnSp>
+      <p:cxnSp>
+        <p:nvCxnSpPr>
+          <p:cNvPr id="7" name="Straight Arrow Connector 6"/>
+          <p:cNvCxnSpPr/>
+          <p:nvPr/>
+        </p:nvCxnSpPr>
+        <p:spPr>
+          <a:xfrm>
+            <a:off x="8968105" y="2998470"/>
+            <a:ext cx="635000" cy="0"/>
+          </a:xfrm>
+          <a:prstGeom prst="straightConnector1">
+            <a:avLst/>
+          </a:prstGeom>
+          <a:ln>
+            <a:tailEnd type="arrow" w="med" len="med"/>
+          </a:ln>
+        </p:spPr>
+        <p:style>
+          <a:lnRef idx="1">
+            <a:schemeClr val="dk1"/>
+          </a:lnRef>
+          <a:fillRef idx="0">
+            <a:schemeClr val="dk1"/>
+          </a:fillRef>
+          <a:effectRef idx="0">
+            <a:schemeClr val="dk1"/>
+          </a:effectRef>
+          <a:fontRef idx="minor">
+            <a:schemeClr val="tx1"/>
+          </a:fontRef>
+        </p:style>
+      </p:cxnSp>
+      <p:sp>
+        <p:nvSpPr>
+          <p:cNvPr id="5" name="Rectangles 4"/>
+          <p:cNvSpPr/>
+          <p:nvPr/>
+        </p:nvSpPr>
+        <p:spPr>
+          <a:xfrm>
+            <a:off x="9590405" y="2192655"/>
+            <a:ext cx="2538730" cy="1610995"/>
+          </a:xfrm>
+          <a:prstGeom prst="rect">
+            <a:avLst/>
+          </a:prstGeom>
+          <a:noFill/>
+          <a:ln>
+            <a:solidFill>
+              <a:srgbClr val="00B0F0"/>
+            </a:solidFill>
+          </a:ln>
+          <a:extLst>
+            <a:ext uri="{909E8E84-426E-40DD-AFC4-6F175D3DCCD1}">
+              <a14:hiddenFill xmlns:a14="http://schemas.microsoft.com/office/drawing/2010/main">
+                <a:solidFill>
+                  <a:schemeClr val="accent1">
+                    <a:lumMod val="20000"/>
+                    <a:lumOff val="80000"/>
+                  </a:schemeClr>
+                </a:solidFill>
+              </a14:hiddenFill>
+            </a:ext>
+          </a:extLst>
+        </p:spPr>
+        <p:style>
+          <a:lnRef idx="2">
+            <a:schemeClr val="dk1">
+              <a:shade val="50000"/>
+            </a:schemeClr>
+          </a:lnRef>
+          <a:fillRef idx="1">
+            <a:schemeClr val="dk1"/>
+          </a:fillRef>
+          <a:effectRef idx="0">
+            <a:schemeClr val="dk1"/>
+          </a:effectRef>
+          <a:fontRef idx="minor">
+            <a:schemeClr val="lt1"/>
+          </a:fontRef>
+        </p:style>
+        <p:txBody>
+          <a:bodyPr rtlCol="0" anchor="ctr"/>
+          <a:p>
+            <a:pPr algn="ctr"/>
+            <a:r>
+              <a:rPr lang="en-US" b="1">
+                <a:solidFill>
+                  <a:schemeClr val="tx1"/>
+                </a:solidFill>
+                <a:effectLst/>
+              </a:rPr>
+              <a:t>Creates and invokes the native methode</a:t>
+            </a:r>
+            <a:endParaRPr lang="en-US" b="1">
+              <a:solidFill>
+                <a:schemeClr val="tx1"/>
+              </a:solidFill>
+              <a:effectLst/>
+            </a:endParaRPr>
+          </a:p>
+        </p:txBody>
+      </p:sp>
+      <p:cxnSp>
+        <p:nvCxnSpPr>
+          <p:cNvPr id="6" name="Straight Arrow Connector 5"/>
+          <p:cNvCxnSpPr/>
+          <p:nvPr/>
+        </p:nvCxnSpPr>
+        <p:spPr>
+          <a:xfrm>
+            <a:off x="10704830" y="3852545"/>
+            <a:ext cx="10160" cy="678815"/>
+          </a:xfrm>
+          <a:prstGeom prst="straightConnector1">
+            <a:avLst/>
+          </a:prstGeom>
+          <a:ln>
+            <a:tailEnd type="arrow" w="med" len="med"/>
+          </a:ln>
+        </p:spPr>
+        <p:style>
+          <a:lnRef idx="1">
+            <a:schemeClr val="dk1"/>
+          </a:lnRef>
+          <a:fillRef idx="0">
+            <a:schemeClr val="dk1"/>
+          </a:fillRef>
+          <a:effectRef idx="0">
+            <a:schemeClr val="dk1"/>
+          </a:effectRef>
+          <a:fontRef idx="minor">
+            <a:schemeClr val="tx1"/>
+          </a:fontRef>
+        </p:style>
+      </p:cxnSp>
+      <p:sp>
+        <p:nvSpPr>
+          <p:cNvPr id="8" name="Rectangles 7"/>
+          <p:cNvSpPr/>
+          <p:nvPr/>
+        </p:nvSpPr>
+        <p:spPr>
+          <a:xfrm>
+            <a:off x="2809240" y="4980305"/>
+            <a:ext cx="2985135" cy="368300"/>
+          </a:xfrm>
+          <a:prstGeom prst="rect">
+            <a:avLst/>
+          </a:prstGeom>
+          <a:noFill/>
+          <a:ln w="9525">
+            <a:noFill/>
+          </a:ln>
+        </p:spPr>
+        <p:txBody>
+          <a:bodyPr vert="horz" wrap="square" rtlCol="0" anchor="ctr" anchorCtr="0"/>
+          <a:p>
+            <a:pPr lvl="0" algn="ctr" fontAlgn="base">
+              <a:buClrTx/>
+              <a:buSzTx/>
+              <a:buFontTx/>
+            </a:pPr>
+            <a:r>
+              <a:rPr lang="en-US" sz="3200">
+                <a:effectLst>
+                  <a:outerShdw blurRad="38100" dist="19050" dir="2700000" algn="tl" rotWithShape="0">
+                    <a:schemeClr val="dk1">
+                      <a:alpha val="40000"/>
+                    </a:schemeClr>
+                  </a:outerShdw>
+                </a:effectLst>
+                <a:latin typeface="MS PGothic" panose="020B0600070205080204" charset="-128"/>
+                <a:ea typeface="MS PGothic" panose="020B0600070205080204" charset="-128"/>
+                <a:cs typeface="+mj-cs"/>
+                <a:sym typeface="+mn-ea"/>
+              </a:rPr>
+              <a:t>Using JNI.cpp</a:t>
+            </a:r>
+            <a:endParaRPr lang="en-US" sz="3200">
+              <a:effectLst>
+                <a:outerShdw blurRad="38100" dist="19050" dir="2700000" algn="tl" rotWithShape="0">
+                  <a:schemeClr val="dk1">
+                    <a:alpha val="40000"/>
+                  </a:schemeClr>
+                </a:outerShdw>
+              </a:effectLst>
+              <a:latin typeface="MS PGothic" panose="020B0600070205080204" charset="-128"/>
+              <a:ea typeface="MS PGothic" panose="020B0600070205080204" charset="-128"/>
+              <a:cs typeface="+mj-cs"/>
+              <a:sym typeface="+mn-ea"/>
+            </a:endParaRPr>
+          </a:p>
+        </p:txBody>
+      </p:sp>
+    </p:spTree>
+  </p:cSld>
+  <p:clrMapOvr>
+    <a:masterClrMapping/>
+  </p:clrMapOvr>
+</p:sld>
+</file>
+
+<file path=ppt/slides/slide7.xml><?xml version="1.0" encoding="utf-8"?>
+<p:sld xmlns:a="http://schemas.openxmlformats.org/drawingml/2006/main" xmlns:r="http://schemas.openxmlformats.org/officeDocument/2006/relationships" xmlns:p="http://schemas.openxmlformats.org/presentationml/2006/main">
+  <p:cSld>
+    <p:spTree>
+      <p:nvGrpSpPr>
+        <p:cNvPr id="1" name=""/>
+        <p:cNvGrpSpPr/>
+        <p:nvPr/>
+      </p:nvGrpSpPr>
+      <p:grpSpPr/>
+      <p:sp>
+        <p:nvSpPr>
+          <p:cNvPr id="2" name="Title 1"/>
+          <p:cNvSpPr>
+            <a:spLocks noGrp="1"/>
+          </p:cNvSpPr>
+          <p:nvPr>
+            <p:ph type="title"/>
+          </p:nvPr>
+        </p:nvSpPr>
+        <p:spPr>
+          <a:xfrm>
+            <a:off x="698500" y="360045"/>
+            <a:ext cx="10694670" cy="1318260"/>
+          </a:xfrm>
+        </p:spPr>
+        <p:txBody>
+          <a:bodyPr/>
+          <a:p>
+            <a:r>
+              <a:rPr lang="en-US">
+                <a:solidFill>
+                  <a:schemeClr val="tx1"/>
+                </a:solidFill>
+                <a:effectLst>
+                  <a:outerShdw blurRad="38100" dist="19050" dir="2700000" algn="tl" rotWithShape="0">
+                    <a:schemeClr val="dk1">
+                      <a:alpha val="40000"/>
+                    </a:schemeClr>
+                  </a:outerShdw>
+                </a:effectLst>
+                <a:latin typeface="MS PGothic" panose="020B0600070205080204" charset="-128"/>
+                <a:ea typeface="MS PGothic" panose="020B0600070205080204" charset="-128"/>
+                <a:sym typeface="+mn-ea"/>
+              </a:rPr>
+              <a:t>EXPOSING C++ API TO JAVA - Approach 3</a:t>
+            </a:r>
+            <a:endParaRPr lang="en-US">
+              <a:solidFill>
+                <a:schemeClr val="tx1"/>
+              </a:solidFill>
+              <a:effectLst>
+                <a:outerShdw blurRad="38100" dist="19050" dir="2700000" algn="tl" rotWithShape="0">
+                  <a:schemeClr val="dk1">
+                    <a:alpha val="40000"/>
+                  </a:schemeClr>
+                </a:outerShdw>
+              </a:effectLst>
+              <a:latin typeface="MS PGothic" panose="020B0600070205080204" charset="-128"/>
+              <a:ea typeface="MS PGothic" panose="020B0600070205080204" charset="-128"/>
+              <a:sym typeface="+mn-ea"/>
+            </a:endParaRPr>
+          </a:p>
+        </p:txBody>
+      </p:sp>
+      <p:sp>
+        <p:nvSpPr>
+          <p:cNvPr id="34" name="Rectangles 33"/>
+          <p:cNvSpPr/>
+          <p:nvPr/>
+        </p:nvSpPr>
+        <p:spPr>
+          <a:xfrm>
+            <a:off x="9537065" y="2713990"/>
+            <a:ext cx="2538730" cy="1610995"/>
+          </a:xfrm>
+          <a:prstGeom prst="rect">
+            <a:avLst/>
+          </a:prstGeom>
+          <a:solidFill>
+            <a:schemeClr val="bg1"/>
+          </a:solidFill>
+          <a:ln>
+            <a:solidFill>
+              <a:srgbClr val="92D050"/>
+            </a:solidFill>
+          </a:ln>
+        </p:spPr>
+        <p:style>
+          <a:lnRef idx="2">
+            <a:schemeClr val="dk1">
+              <a:shade val="50000"/>
+            </a:schemeClr>
+          </a:lnRef>
+          <a:fillRef idx="1">
+            <a:schemeClr val="dk1"/>
+          </a:fillRef>
+          <a:effectRef idx="0">
+            <a:schemeClr val="dk1"/>
+          </a:effectRef>
+          <a:fontRef idx="minor">
+            <a:schemeClr val="lt1"/>
+          </a:fontRef>
+        </p:style>
+        <p:txBody>
+          <a:bodyPr rtlCol="0" anchor="ctr"/>
+          <a:p>
+            <a:pPr algn="ctr"/>
+            <a:r>
+              <a:rPr lang="en-US" b="1">
+                <a:solidFill>
+                  <a:schemeClr val="tx1"/>
+                </a:solidFill>
+                <a:effectLst/>
+                <a:sym typeface="+mn-ea"/>
+              </a:rPr>
+              <a:t>Output: C++ code runing in Java enviroment</a:t>
+            </a:r>
+            <a:endParaRPr lang="en-US" b="1">
+              <a:solidFill>
+                <a:schemeClr val="tx1"/>
+              </a:solidFill>
+              <a:effectLst/>
+            </a:endParaRPr>
+          </a:p>
+        </p:txBody>
+      </p:sp>
+      <p:sp>
+        <p:nvSpPr>
+          <p:cNvPr id="37" name="Rectangles 36"/>
+          <p:cNvSpPr/>
+          <p:nvPr/>
+        </p:nvSpPr>
+        <p:spPr>
+          <a:xfrm>
+            <a:off x="4776470" y="2713990"/>
+            <a:ext cx="2538730" cy="1610995"/>
+          </a:xfrm>
+          <a:prstGeom prst="rect">
+            <a:avLst/>
+          </a:prstGeom>
+          <a:solidFill>
+            <a:schemeClr val="bg1"/>
+          </a:solidFill>
+          <a:ln>
+            <a:solidFill>
+              <a:srgbClr val="00B0F0"/>
+            </a:solidFill>
+          </a:ln>
+        </p:spPr>
+        <p:style>
+          <a:lnRef idx="2">
+            <a:schemeClr val="dk1">
+              <a:shade val="50000"/>
+            </a:schemeClr>
+          </a:lnRef>
+          <a:fillRef idx="1">
+            <a:schemeClr val="dk1"/>
+          </a:fillRef>
+          <a:effectRef idx="0">
+            <a:schemeClr val="dk1"/>
+          </a:effectRef>
+          <a:fontRef idx="minor">
+            <a:schemeClr val="lt1"/>
+          </a:fontRef>
+        </p:style>
+        <p:txBody>
+          <a:bodyPr rtlCol="0" anchor="ctr"/>
+          <a:p>
+            <a:pPr algn="ctr"/>
+            <a:r>
+              <a:rPr lang="en-US" b="1">
+                <a:solidFill>
+                  <a:schemeClr val="tx1"/>
+                </a:solidFill>
+                <a:effectLst/>
+              </a:rPr>
+              <a:t>compiling the program produces .class and .java files</a:t>
+            </a:r>
+            <a:endParaRPr lang="en-US" b="1">
+              <a:solidFill>
+                <a:schemeClr val="tx1"/>
+              </a:solidFill>
+              <a:effectLst/>
+            </a:endParaRPr>
+          </a:p>
+        </p:txBody>
+      </p:sp>
+      <p:sp>
+        <p:nvSpPr>
+          <p:cNvPr id="38" name="Rectangles 37"/>
+          <p:cNvSpPr/>
+          <p:nvPr/>
+        </p:nvSpPr>
+        <p:spPr>
+          <a:xfrm>
+            <a:off x="85725" y="2713355"/>
+            <a:ext cx="2538730" cy="1610995"/>
+          </a:xfrm>
+          <a:prstGeom prst="rect">
+            <a:avLst/>
+          </a:prstGeom>
+          <a:solidFill>
+            <a:schemeClr val="bg1"/>
+          </a:solidFill>
+        </p:spPr>
+        <p:style>
+          <a:lnRef idx="2">
+            <a:schemeClr val="dk1">
+              <a:shade val="50000"/>
+            </a:schemeClr>
+          </a:lnRef>
+          <a:fillRef idx="1">
+            <a:schemeClr val="dk1"/>
+          </a:fillRef>
+          <a:effectRef idx="0">
+            <a:schemeClr val="dk1"/>
+          </a:effectRef>
+          <a:fontRef idx="minor">
+            <a:schemeClr val="lt1"/>
+          </a:fontRef>
+        </p:style>
+        <p:txBody>
+          <a:bodyPr rtlCol="0" anchor="ctr"/>
+          <a:p>
+            <a:pPr algn="ctr"/>
+            <a:r>
+              <a:rPr lang="en-US" b="1">
+                <a:solidFill>
+                  <a:schemeClr val="tx1"/>
+                </a:solidFill>
+                <a:effectLst/>
+                <a:sym typeface="+mn-ea"/>
+              </a:rPr>
+              <a:t>Input: A C++ implementation code</a:t>
+            </a:r>
+            <a:endParaRPr lang="en-US" b="1">
+              <a:solidFill>
+                <a:schemeClr val="tx1"/>
+              </a:solidFill>
+              <a:effectLst/>
+              <a:sym typeface="+mn-ea"/>
+            </a:endParaRPr>
+          </a:p>
+          <a:p>
+            <a:pPr algn="ctr"/>
+            <a:r>
+              <a:rPr lang="en-US" b="1">
+                <a:solidFill>
+                  <a:schemeClr val="tx1"/>
+                </a:solidFill>
+                <a:effectLst/>
+              </a:rPr>
+              <a:t>and Swig wrapper file</a:t>
+            </a:r>
+            <a:endParaRPr lang="en-US" b="1">
+              <a:solidFill>
+                <a:schemeClr val="tx1"/>
+              </a:solidFill>
+              <a:effectLst/>
+            </a:endParaRPr>
+          </a:p>
+        </p:txBody>
+      </p:sp>
+      <p:cxnSp>
+        <p:nvCxnSpPr>
+          <p:cNvPr id="3" name="Straight Arrow Connector 2"/>
+          <p:cNvCxnSpPr/>
+          <p:nvPr/>
+        </p:nvCxnSpPr>
+        <p:spPr>
+          <a:xfrm flipV="1">
+            <a:off x="2686050" y="3513455"/>
+            <a:ext cx="2042160" cy="19685"/>
+          </a:xfrm>
+          <a:prstGeom prst="straightConnector1">
+            <a:avLst/>
+          </a:prstGeom>
+          <a:ln>
+            <a:tailEnd type="arrow" w="med" len="med"/>
+          </a:ln>
+        </p:spPr>
+        <p:style>
+          <a:lnRef idx="1">
+            <a:schemeClr val="dk1"/>
+          </a:lnRef>
+          <a:fillRef idx="0">
+            <a:schemeClr val="dk1"/>
+          </a:fillRef>
+          <a:effectRef idx="0">
+            <a:schemeClr val="dk1"/>
+          </a:effectRef>
+          <a:fontRef idx="minor">
+            <a:schemeClr val="tx1"/>
+          </a:fontRef>
+        </p:style>
+      </p:cxnSp>
+      <p:cxnSp>
+        <p:nvCxnSpPr>
+          <p:cNvPr id="4" name="Straight Arrow Connector 3"/>
+          <p:cNvCxnSpPr/>
+          <p:nvPr/>
+        </p:nvCxnSpPr>
+        <p:spPr>
+          <a:xfrm flipV="1">
+            <a:off x="7414895" y="3493770"/>
+            <a:ext cx="2015490" cy="26035"/>
+          </a:xfrm>
+          <a:prstGeom prst="straightConnector1">
+            <a:avLst/>
+          </a:prstGeom>
+          <a:ln>
+            <a:tailEnd type="arrow" w="med" len="med"/>
+          </a:ln>
+        </p:spPr>
+        <p:style>
+          <a:lnRef idx="1">
+            <a:schemeClr val="dk1"/>
+          </a:lnRef>
+          <a:fillRef idx="0">
+            <a:schemeClr val="dk1"/>
+          </a:fillRef>
+          <a:effectRef idx="0">
+            <a:schemeClr val="dk1"/>
+          </a:effectRef>
+          <a:fontRef idx="minor">
+            <a:schemeClr val="tx1"/>
+          </a:fontRef>
+        </p:style>
+      </p:cxnSp>
+      <p:sp>
+        <p:nvSpPr>
+          <p:cNvPr id="8" name="Rectangles 7"/>
+          <p:cNvSpPr/>
+          <p:nvPr/>
+        </p:nvSpPr>
+        <p:spPr>
+          <a:xfrm>
+            <a:off x="2040890" y="5229860"/>
+            <a:ext cx="2985135" cy="368300"/>
+          </a:xfrm>
+          <a:prstGeom prst="rect">
+            <a:avLst/>
+          </a:prstGeom>
+          <a:noFill/>
+          <a:ln w="9525">
+            <a:noFill/>
+          </a:ln>
+        </p:spPr>
+        <p:txBody>
+          <a:bodyPr vert="horz" wrap="square" rtlCol="0" anchor="ctr" anchorCtr="0"/>
+          <a:p>
+            <a:pPr lvl="0" algn="ctr" fontAlgn="base">
+              <a:buClrTx/>
+              <a:buSzTx/>
+              <a:buFontTx/>
+            </a:pPr>
+            <a:r>
+              <a:rPr lang="en-US" sz="3200">
+                <a:effectLst>
+                  <a:outerShdw blurRad="38100" dist="19050" dir="2700000" algn="tl" rotWithShape="0">
+                    <a:schemeClr val="dk1">
+                      <a:alpha val="40000"/>
+                    </a:schemeClr>
+                  </a:outerShdw>
+                </a:effectLst>
+                <a:latin typeface="MS PGothic" panose="020B0600070205080204" charset="-128"/>
+                <a:ea typeface="MS PGothic" panose="020B0600070205080204" charset="-128"/>
+                <a:cs typeface="+mj-cs"/>
+                <a:sym typeface="+mn-ea"/>
+              </a:rPr>
+              <a:t>Using SWIG</a:t>
+            </a:r>
+            <a:endParaRPr lang="en-US" sz="3200">
+              <a:effectLst>
+                <a:outerShdw blurRad="38100" dist="19050" dir="2700000" algn="tl" rotWithShape="0">
+                  <a:schemeClr val="dk1">
+                    <a:alpha val="40000"/>
+                  </a:schemeClr>
+                </a:outerShdw>
+              </a:effectLst>
+              <a:latin typeface="MS PGothic" panose="020B0600070205080204" charset="-128"/>
+              <a:ea typeface="MS PGothic" panose="020B0600070205080204" charset="-128"/>
+              <a:cs typeface="+mj-cs"/>
+              <a:sym typeface="+mn-ea"/>
+            </a:endParaRPr>
+          </a:p>
+        </p:txBody>
+      </p:sp>
+    </p:spTree>
+  </p:cSld>
+  <p:clrMapOvr>
+    <a:masterClrMapping/>
+  </p:clrMapOvr>
+</p:sld>
+</file>
+
+<file path=ppt/slides/slide8.xml><?xml version="1.0" encoding="utf-8"?>
+<p:sld xmlns:a="http://schemas.openxmlformats.org/drawingml/2006/main" xmlns:r="http://schemas.openxmlformats.org/officeDocument/2006/relationships" xmlns:p="http://schemas.openxmlformats.org/presentationml/2006/main">
+  <p:cSld>
+    <p:spTree>
+      <p:nvGrpSpPr>
+        <p:cNvPr id="1" name=""/>
+        <p:cNvGrpSpPr/>
+        <p:nvPr/>
+      </p:nvGrpSpPr>
+      <p:grpSpPr/>
+      <p:sp>
+        <p:nvSpPr>
+          <p:cNvPr id="2" name="Title 1"/>
+          <p:cNvSpPr>
+            <a:spLocks noGrp="1"/>
+          </p:cNvSpPr>
+          <p:nvPr>
+            <p:ph type="title"/>
+          </p:nvPr>
+        </p:nvSpPr>
+        <p:spPr>
+          <a:xfrm>
+            <a:off x="698500" y="360045"/>
+            <a:ext cx="10694670" cy="1318260"/>
+          </a:xfrm>
+        </p:spPr>
+        <p:txBody>
+          <a:bodyPr/>
+          <a:p>
+            <a:r>
+              <a:rPr lang="en-US">
+                <a:solidFill>
+                  <a:schemeClr val="tx1"/>
+                </a:solidFill>
+                <a:effectLst>
+                  <a:outerShdw blurRad="38100" dist="19050" dir="2700000" algn="tl" rotWithShape="0">
+                    <a:schemeClr val="dk1">
+                      <a:alpha val="40000"/>
+                    </a:schemeClr>
+                  </a:outerShdw>
+                </a:effectLst>
+                <a:latin typeface="MS PGothic" panose="020B0600070205080204" charset="-128"/>
+                <a:ea typeface="MS PGothic" panose="020B0600070205080204" charset="-128"/>
+                <a:sym typeface="+mn-ea"/>
+              </a:rPr>
+              <a:t>EXPOSING C++ API TO JAVA - Approach 2</a:t>
+            </a:r>
+            <a:endParaRPr lang="en-US">
+              <a:solidFill>
+                <a:schemeClr val="tx1"/>
+              </a:solidFill>
+              <a:effectLst>
+                <a:outerShdw blurRad="38100" dist="19050" dir="2700000" algn="tl" rotWithShape="0">
+                  <a:schemeClr val="dk1">
+                    <a:alpha val="40000"/>
+                  </a:schemeClr>
+                </a:outerShdw>
+              </a:effectLst>
+              <a:latin typeface="MS PGothic" panose="020B0600070205080204" charset="-128"/>
+              <a:ea typeface="MS PGothic" panose="020B0600070205080204" charset="-128"/>
+              <a:sym typeface="+mn-ea"/>
+            </a:endParaRPr>
+          </a:p>
+        </p:txBody>
+      </p:sp>
+      <p:sp>
+        <p:nvSpPr>
+          <p:cNvPr id="34" name="Rectangles 33"/>
+          <p:cNvSpPr/>
+          <p:nvPr/>
+        </p:nvSpPr>
+        <p:spPr>
+          <a:xfrm>
+            <a:off x="9440545" y="4569460"/>
+            <a:ext cx="2538730" cy="1610995"/>
+          </a:xfrm>
+          <a:prstGeom prst="rect">
+            <a:avLst/>
+          </a:prstGeom>
+          <a:solidFill>
+            <a:schemeClr val="bg1"/>
+          </a:solidFill>
+          <a:ln>
+            <a:solidFill>
+              <a:srgbClr val="92D050"/>
+            </a:solidFill>
+          </a:ln>
+        </p:spPr>
+        <p:style>
+          <a:lnRef idx="2">
+            <a:schemeClr val="dk1">
+              <a:shade val="50000"/>
+            </a:schemeClr>
+          </a:lnRef>
+          <a:fillRef idx="1">
+            <a:schemeClr val="dk1"/>
+          </a:fillRef>
+          <a:effectRef idx="0">
+            <a:schemeClr val="dk1"/>
+          </a:effectRef>
+          <a:fontRef idx="minor">
+            <a:schemeClr val="lt1"/>
+          </a:fontRef>
+        </p:style>
+        <p:txBody>
+          <a:bodyPr rtlCol="0" anchor="ctr"/>
+          <a:p>
+            <a:pPr algn="ctr"/>
+            <a:r>
+              <a:rPr lang="en-US" b="1">
+                <a:solidFill>
+                  <a:schemeClr val="tx1"/>
+                </a:solidFill>
+                <a:effectLst/>
+              </a:rPr>
+              <a:t>Output: C++ code runing in Java enviroment</a:t>
+            </a:r>
+            <a:endParaRPr lang="en-US" b="1">
+              <a:solidFill>
+                <a:schemeClr val="tx1"/>
+              </a:solidFill>
+              <a:effectLst/>
+            </a:endParaRPr>
+          </a:p>
+        </p:txBody>
+      </p:sp>
+      <p:sp>
+        <p:nvSpPr>
+          <p:cNvPr id="36" name="Rectangles 35"/>
+          <p:cNvSpPr/>
+          <p:nvPr/>
+        </p:nvSpPr>
+        <p:spPr>
+          <a:xfrm>
+            <a:off x="6438900" y="2192655"/>
+            <a:ext cx="2538730" cy="1610995"/>
+          </a:xfrm>
+          <a:prstGeom prst="rect">
+            <a:avLst/>
+          </a:prstGeom>
+          <a:noFill/>
+          <a:ln>
+            <a:solidFill>
+              <a:srgbClr val="00B0F0"/>
+            </a:solidFill>
+          </a:ln>
+          <a:extLst>
+            <a:ext uri="{909E8E84-426E-40DD-AFC4-6F175D3DCCD1}">
+              <a14:hiddenFill xmlns:a14="http://schemas.microsoft.com/office/drawing/2010/main">
+                <a:solidFill>
+                  <a:schemeClr val="accent1">
+                    <a:lumMod val="20000"/>
+                    <a:lumOff val="80000"/>
+                  </a:schemeClr>
+                </a:solidFill>
+              </a14:hiddenFill>
+            </a:ext>
+          </a:extLst>
+        </p:spPr>
+        <p:style>
+          <a:lnRef idx="2">
+            <a:schemeClr val="dk1">
+              <a:shade val="50000"/>
+            </a:schemeClr>
+          </a:lnRef>
+          <a:fillRef idx="1">
+            <a:schemeClr val="dk1"/>
+          </a:fillRef>
+          <a:effectRef idx="0">
+            <a:schemeClr val="dk1"/>
+          </a:effectRef>
+          <a:fontRef idx="minor">
+            <a:schemeClr val="lt1"/>
+          </a:fontRef>
+        </p:style>
+        <p:txBody>
+          <a:bodyPr rtlCol="0" anchor="ctr"/>
+          <a:p>
+            <a:pPr algn="ctr"/>
+            <a:r>
+              <a:rPr lang="en-US" b="1">
+                <a:solidFill>
+                  <a:schemeClr val="tx1"/>
+                </a:solidFill>
+                <a:effectLst/>
+              </a:rPr>
+              <a:t>Java compiler loads native library</a:t>
+            </a:r>
+            <a:endParaRPr lang="en-US" b="1">
+              <a:solidFill>
+                <a:schemeClr val="tx1"/>
+              </a:solidFill>
+              <a:effectLst/>
+            </a:endParaRPr>
+          </a:p>
+        </p:txBody>
+      </p:sp>
+      <p:sp>
+        <p:nvSpPr>
+          <p:cNvPr id="37" name="Rectangles 36"/>
+          <p:cNvSpPr/>
+          <p:nvPr/>
+        </p:nvSpPr>
+        <p:spPr>
+          <a:xfrm>
+            <a:off x="3268345" y="2192655"/>
+            <a:ext cx="2538730" cy="1610995"/>
+          </a:xfrm>
+          <a:prstGeom prst="rect">
+            <a:avLst/>
+          </a:prstGeom>
+          <a:solidFill>
+            <a:schemeClr val="bg1"/>
+          </a:solidFill>
+          <a:ln>
+            <a:solidFill>
+              <a:srgbClr val="00B0F0"/>
+            </a:solidFill>
+          </a:ln>
+        </p:spPr>
+        <p:style>
+          <a:lnRef idx="2">
+            <a:schemeClr val="dk1">
+              <a:shade val="50000"/>
+            </a:schemeClr>
+          </a:lnRef>
+          <a:fillRef idx="1">
+            <a:schemeClr val="dk1"/>
+          </a:fillRef>
+          <a:effectRef idx="0">
+            <a:schemeClr val="dk1"/>
+          </a:effectRef>
+          <a:fontRef idx="minor">
+            <a:schemeClr val="lt1"/>
+          </a:fontRef>
+        </p:style>
+        <p:txBody>
+          <a:bodyPr rtlCol="0" anchor="ctr"/>
+          <a:p>
+            <a:pPr algn="ctr"/>
+            <a:r>
+              <a:rPr lang="en-US" b="1">
+                <a:solidFill>
+                  <a:schemeClr val="tx1"/>
+                </a:solidFill>
+                <a:effectLst/>
+              </a:rPr>
+              <a:t>JNIEXPORT and JNICALL produce a C++ code in native methode</a:t>
+            </a:r>
+            <a:endParaRPr lang="en-US" b="1">
+              <a:solidFill>
+                <a:schemeClr val="tx1"/>
+              </a:solidFill>
+              <a:effectLst/>
+            </a:endParaRPr>
+          </a:p>
+        </p:txBody>
+      </p:sp>
+      <p:sp>
+        <p:nvSpPr>
+          <p:cNvPr id="38" name="Rectangles 37"/>
+          <p:cNvSpPr/>
+          <p:nvPr/>
+        </p:nvSpPr>
+        <p:spPr>
+          <a:xfrm>
+            <a:off x="101600" y="2192655"/>
+            <a:ext cx="2538730" cy="1610995"/>
+          </a:xfrm>
+          <a:prstGeom prst="rect">
+            <a:avLst/>
+          </a:prstGeom>
+          <a:solidFill>
+            <a:schemeClr val="bg1"/>
+          </a:solidFill>
+        </p:spPr>
+        <p:style>
+          <a:lnRef idx="2">
+            <a:schemeClr val="dk1">
+              <a:shade val="50000"/>
+            </a:schemeClr>
+          </a:lnRef>
+          <a:fillRef idx="1">
+            <a:schemeClr val="dk1"/>
+          </a:fillRef>
+          <a:effectRef idx="0">
+            <a:schemeClr val="dk1"/>
+          </a:effectRef>
+          <a:fontRef idx="minor">
+            <a:schemeClr val="lt1"/>
+          </a:fontRef>
+        </p:style>
+        <p:txBody>
+          <a:bodyPr rtlCol="0" anchor="ctr"/>
+          <a:p>
+            <a:pPr algn="ctr"/>
+            <a:r>
+              <a:rPr lang="en-US" b="1">
+                <a:solidFill>
+                  <a:schemeClr val="tx1"/>
+                </a:solidFill>
+                <a:effectLst/>
+              </a:rPr>
+              <a:t>Input: A C++ implementation code</a:t>
+            </a:r>
+            <a:endParaRPr lang="en-US" b="1">
+              <a:solidFill>
+                <a:schemeClr val="tx1"/>
+              </a:solidFill>
+              <a:effectLst/>
+            </a:endParaRPr>
+          </a:p>
+        </p:txBody>
+      </p:sp>
+      <p:cxnSp>
+        <p:nvCxnSpPr>
+          <p:cNvPr id="3" name="Straight Arrow Connector 2"/>
+          <p:cNvCxnSpPr/>
+          <p:nvPr/>
+        </p:nvCxnSpPr>
+        <p:spPr>
+          <a:xfrm>
+            <a:off x="2626995" y="2998470"/>
+            <a:ext cx="650875" cy="0"/>
+          </a:xfrm>
+          <a:prstGeom prst="straightConnector1">
+            <a:avLst/>
+          </a:prstGeom>
+          <a:ln>
+            <a:tailEnd type="arrow" w="med" len="med"/>
+          </a:ln>
+        </p:spPr>
+        <p:style>
+          <a:lnRef idx="1">
+            <a:schemeClr val="dk1"/>
+          </a:lnRef>
+          <a:fillRef idx="0">
+            <a:schemeClr val="dk1"/>
+          </a:fillRef>
+          <a:effectRef idx="0">
+            <a:schemeClr val="dk1"/>
+          </a:effectRef>
+          <a:fontRef idx="minor">
+            <a:schemeClr val="tx1"/>
+          </a:fontRef>
+        </p:style>
+      </p:cxnSp>
+      <p:cxnSp>
+        <p:nvCxnSpPr>
+          <p:cNvPr id="4" name="Straight Arrow Connector 3"/>
+          <p:cNvCxnSpPr/>
+          <p:nvPr/>
+        </p:nvCxnSpPr>
+        <p:spPr>
+          <a:xfrm>
+            <a:off x="5794375" y="2998470"/>
+            <a:ext cx="635000" cy="0"/>
+          </a:xfrm>
+          <a:prstGeom prst="straightConnector1">
+            <a:avLst/>
+          </a:prstGeom>
+          <a:ln>
+            <a:tailEnd type="arrow" w="med" len="med"/>
+          </a:ln>
+        </p:spPr>
+        <p:style>
+          <a:lnRef idx="1">
+            <a:schemeClr val="dk1"/>
+          </a:lnRef>
+          <a:fillRef idx="0">
+            <a:schemeClr val="dk1"/>
+          </a:fillRef>
+          <a:effectRef idx="0">
+            <a:schemeClr val="dk1"/>
+          </a:effectRef>
+          <a:fontRef idx="minor">
+            <a:schemeClr val="tx1"/>
+          </a:fontRef>
+        </p:style>
+      </p:cxnSp>
+      <p:cxnSp>
+        <p:nvCxnSpPr>
+          <p:cNvPr id="7" name="Straight Arrow Connector 6"/>
+          <p:cNvCxnSpPr/>
+          <p:nvPr/>
+        </p:nvCxnSpPr>
+        <p:spPr>
+          <a:xfrm>
+            <a:off x="8968105" y="2998470"/>
+            <a:ext cx="635000" cy="0"/>
+          </a:xfrm>
+          <a:prstGeom prst="straightConnector1">
+            <a:avLst/>
+          </a:prstGeom>
+          <a:ln>
+            <a:tailEnd type="arrow" w="med" len="med"/>
+          </a:ln>
+        </p:spPr>
+        <p:style>
+          <a:lnRef idx="1">
+            <a:schemeClr val="dk1"/>
+          </a:lnRef>
+          <a:fillRef idx="0">
+            <a:schemeClr val="dk1"/>
+          </a:fillRef>
+          <a:effectRef idx="0">
+            <a:schemeClr val="dk1"/>
+          </a:effectRef>
+          <a:fontRef idx="minor">
+            <a:schemeClr val="tx1"/>
+          </a:fontRef>
+        </p:style>
+      </p:cxnSp>
+      <p:sp>
+        <p:nvSpPr>
+          <p:cNvPr id="5" name="Rectangles 4"/>
+          <p:cNvSpPr/>
+          <p:nvPr/>
+        </p:nvSpPr>
+        <p:spPr>
+          <a:xfrm>
+            <a:off x="9590405" y="2192655"/>
+            <a:ext cx="2538730" cy="1610995"/>
+          </a:xfrm>
+          <a:prstGeom prst="rect">
+            <a:avLst/>
+          </a:prstGeom>
+          <a:noFill/>
+          <a:ln>
+            <a:solidFill>
+              <a:srgbClr val="00B0F0"/>
+            </a:solidFill>
+          </a:ln>
+          <a:extLst>
+            <a:ext uri="{909E8E84-426E-40DD-AFC4-6F175D3DCCD1}">
+              <a14:hiddenFill xmlns:a14="http://schemas.microsoft.com/office/drawing/2010/main">
+                <a:solidFill>
+                  <a:schemeClr val="accent1">
+                    <a:lumMod val="20000"/>
+                    <a:lumOff val="80000"/>
+                  </a:schemeClr>
+                </a:solidFill>
+              </a14:hiddenFill>
+            </a:ext>
+          </a:extLst>
+        </p:spPr>
+        <p:style>
+          <a:lnRef idx="2">
+            <a:schemeClr val="dk1">
+              <a:shade val="50000"/>
+            </a:schemeClr>
+          </a:lnRef>
+          <a:fillRef idx="1">
+            <a:schemeClr val="dk1"/>
+          </a:fillRef>
+          <a:effectRef idx="0">
+            <a:schemeClr val="dk1"/>
+          </a:effectRef>
+          <a:fontRef idx="minor">
+            <a:schemeClr val="lt1"/>
+          </a:fontRef>
+        </p:style>
+        <p:txBody>
+          <a:bodyPr rtlCol="0" anchor="ctr"/>
+          <a:p>
+            <a:pPr algn="ctr"/>
+            <a:r>
+              <a:rPr lang="en-US" b="1">
+                <a:solidFill>
+                  <a:schemeClr val="tx1"/>
+                </a:solidFill>
+                <a:effectLst/>
+              </a:rPr>
+              <a:t>Creates and invokes the native methode</a:t>
+            </a:r>
+            <a:endParaRPr lang="en-US" b="1">
+              <a:solidFill>
+                <a:schemeClr val="tx1"/>
+              </a:solidFill>
+              <a:effectLst/>
+            </a:endParaRPr>
+          </a:p>
+        </p:txBody>
+      </p:sp>
+      <p:cxnSp>
+        <p:nvCxnSpPr>
+          <p:cNvPr id="6" name="Straight Arrow Connector 5"/>
+          <p:cNvCxnSpPr/>
+          <p:nvPr/>
+        </p:nvCxnSpPr>
+        <p:spPr>
+          <a:xfrm>
+            <a:off x="10704830" y="3852545"/>
+            <a:ext cx="10160" cy="678815"/>
+          </a:xfrm>
+          <a:prstGeom prst="straightConnector1">
+            <a:avLst/>
+          </a:prstGeom>
+          <a:ln>
+            <a:tailEnd type="arrow" w="med" len="med"/>
+          </a:ln>
+        </p:spPr>
+        <p:style>
+          <a:lnRef idx="1">
+            <a:schemeClr val="dk1"/>
+          </a:lnRef>
+          <a:fillRef idx="0">
+            <a:schemeClr val="dk1"/>
+          </a:fillRef>
+          <a:effectRef idx="0">
+            <a:schemeClr val="dk1"/>
+          </a:effectRef>
+          <a:fontRef idx="minor">
+            <a:schemeClr val="tx1"/>
+          </a:fontRef>
+        </p:style>
+      </p:cxnSp>
+      <p:sp>
+        <p:nvSpPr>
+          <p:cNvPr id="9" name="Rectangles 8"/>
+          <p:cNvSpPr/>
+          <p:nvPr/>
+        </p:nvSpPr>
+        <p:spPr>
+          <a:xfrm>
+            <a:off x="2040890" y="5229860"/>
+            <a:ext cx="2985135" cy="368300"/>
+          </a:xfrm>
+          <a:prstGeom prst="rect">
+            <a:avLst/>
+          </a:prstGeom>
+          <a:noFill/>
+          <a:ln w="9525">
+            <a:noFill/>
+          </a:ln>
+        </p:spPr>
+        <p:txBody>
+          <a:bodyPr vert="horz" wrap="square" rtlCol="0" anchor="ctr" anchorCtr="0"/>
+          <a:p>
+            <a:pPr lvl="0" algn="ctr" fontAlgn="base">
+              <a:buClrTx/>
+              <a:buSzTx/>
+              <a:buFontTx/>
+            </a:pPr>
+            <a:r>
+              <a:rPr lang="en-US" sz="3200">
+                <a:effectLst>
+                  <a:outerShdw blurRad="38100" dist="19050" dir="2700000" algn="tl" rotWithShape="0">
+                    <a:schemeClr val="dk1">
+                      <a:alpha val="40000"/>
+                    </a:schemeClr>
+                  </a:outerShdw>
+                </a:effectLst>
+                <a:latin typeface="MS PGothic" panose="020B0600070205080204" charset="-128"/>
+                <a:ea typeface="MS PGothic" panose="020B0600070205080204" charset="-128"/>
+                <a:cs typeface="+mj-cs"/>
+                <a:sym typeface="+mn-ea"/>
+              </a:rPr>
+              <a:t>Using Scapix</a:t>
+            </a:r>
+            <a:endParaRPr lang="en-US" sz="3200">
+              <a:effectLst>
+                <a:outerShdw blurRad="38100" dist="19050" dir="2700000" algn="tl" rotWithShape="0">
+                  <a:schemeClr val="dk1">
+                    <a:alpha val="40000"/>
+                  </a:schemeClr>
+                </a:outerShdw>
+              </a:effectLst>
+              <a:latin typeface="MS PGothic" panose="020B0600070205080204" charset="-128"/>
+              <a:ea typeface="MS PGothic" panose="020B0600070205080204" charset="-128"/>
+              <a:cs typeface="+mj-cs"/>
+              <a:sym typeface="+mn-ea"/>
+            </a:endParaRPr>
+          </a:p>
+        </p:txBody>
+      </p:sp>
     </p:spTree>
   </p:cSld>
   <p:clrMapOvr>

</xml_diff>